<commit_message>
update icons and questions
</commit_message>
<xml_diff>
--- a/prototype/prototype.pptx
+++ b/prototype/prototype.pptx
@@ -10,11 +10,10 @@
     <p:sldId id="275" r:id="rId4"/>
     <p:sldId id="263" r:id="rId5"/>
     <p:sldId id="269" r:id="rId6"/>
-    <p:sldId id="268" r:id="rId7"/>
-    <p:sldId id="270" r:id="rId8"/>
-    <p:sldId id="272" r:id="rId9"/>
-    <p:sldId id="271" r:id="rId10"/>
-    <p:sldId id="274" r:id="rId11"/>
+    <p:sldId id="270" r:id="rId7"/>
+    <p:sldId id="272" r:id="rId8"/>
+    <p:sldId id="271" r:id="rId9"/>
+    <p:sldId id="274" r:id="rId10"/>
   </p:sldIdLst>
   <p:sldSz cx="9906000" cy="6858000" type="A4"/>
   <p:notesSz cx="6858000" cy="9144000"/>
@@ -252,7 +251,7 @@
           <a:p>
             <a:fld id="{335A01E9-5263-49B0-BF31-C9D0821B9F5E}" type="datetimeFigureOut">
               <a:rPr lang="en-NL" smtClean="0"/>
-              <a:t>03/05/2025</a:t>
+              <a:t>04/05/2025</a:t>
             </a:fld>
             <a:endParaRPr lang="en-NL"/>
           </a:p>
@@ -422,7 +421,7 @@
           <a:p>
             <a:fld id="{335A01E9-5263-49B0-BF31-C9D0821B9F5E}" type="datetimeFigureOut">
               <a:rPr lang="en-NL" smtClean="0"/>
-              <a:t>03/05/2025</a:t>
+              <a:t>04/05/2025</a:t>
             </a:fld>
             <a:endParaRPr lang="en-NL"/>
           </a:p>
@@ -602,7 +601,7 @@
           <a:p>
             <a:fld id="{335A01E9-5263-49B0-BF31-C9D0821B9F5E}" type="datetimeFigureOut">
               <a:rPr lang="en-NL" smtClean="0"/>
-              <a:t>03/05/2025</a:t>
+              <a:t>04/05/2025</a:t>
             </a:fld>
             <a:endParaRPr lang="en-NL"/>
           </a:p>
@@ -772,7 +771,7 @@
           <a:p>
             <a:fld id="{335A01E9-5263-49B0-BF31-C9D0821B9F5E}" type="datetimeFigureOut">
               <a:rPr lang="en-NL" smtClean="0"/>
-              <a:t>03/05/2025</a:t>
+              <a:t>04/05/2025</a:t>
             </a:fld>
             <a:endParaRPr lang="en-NL"/>
           </a:p>
@@ -1018,7 +1017,7 @@
           <a:p>
             <a:fld id="{335A01E9-5263-49B0-BF31-C9D0821B9F5E}" type="datetimeFigureOut">
               <a:rPr lang="en-NL" smtClean="0"/>
-              <a:t>03/05/2025</a:t>
+              <a:t>04/05/2025</a:t>
             </a:fld>
             <a:endParaRPr lang="en-NL"/>
           </a:p>
@@ -1250,7 +1249,7 @@
           <a:p>
             <a:fld id="{335A01E9-5263-49B0-BF31-C9D0821B9F5E}" type="datetimeFigureOut">
               <a:rPr lang="en-NL" smtClean="0"/>
-              <a:t>03/05/2025</a:t>
+              <a:t>04/05/2025</a:t>
             </a:fld>
             <a:endParaRPr lang="en-NL"/>
           </a:p>
@@ -1617,7 +1616,7 @@
           <a:p>
             <a:fld id="{335A01E9-5263-49B0-BF31-C9D0821B9F5E}" type="datetimeFigureOut">
               <a:rPr lang="en-NL" smtClean="0"/>
-              <a:t>03/05/2025</a:t>
+              <a:t>04/05/2025</a:t>
             </a:fld>
             <a:endParaRPr lang="en-NL"/>
           </a:p>
@@ -1735,7 +1734,7 @@
           <a:p>
             <a:fld id="{335A01E9-5263-49B0-BF31-C9D0821B9F5E}" type="datetimeFigureOut">
               <a:rPr lang="en-NL" smtClean="0"/>
-              <a:t>03/05/2025</a:t>
+              <a:t>04/05/2025</a:t>
             </a:fld>
             <a:endParaRPr lang="en-NL"/>
           </a:p>
@@ -1830,7 +1829,7 @@
           <a:p>
             <a:fld id="{335A01E9-5263-49B0-BF31-C9D0821B9F5E}" type="datetimeFigureOut">
               <a:rPr lang="en-NL" smtClean="0"/>
-              <a:t>03/05/2025</a:t>
+              <a:t>04/05/2025</a:t>
             </a:fld>
             <a:endParaRPr lang="en-NL"/>
           </a:p>
@@ -2107,7 +2106,7 @@
           <a:p>
             <a:fld id="{335A01E9-5263-49B0-BF31-C9D0821B9F5E}" type="datetimeFigureOut">
               <a:rPr lang="en-NL" smtClean="0"/>
-              <a:t>03/05/2025</a:t>
+              <a:t>04/05/2025</a:t>
             </a:fld>
             <a:endParaRPr lang="en-NL"/>
           </a:p>
@@ -2364,7 +2363,7 @@
           <a:p>
             <a:fld id="{335A01E9-5263-49B0-BF31-C9D0821B9F5E}" type="datetimeFigureOut">
               <a:rPr lang="en-NL" smtClean="0"/>
-              <a:t>03/05/2025</a:t>
+              <a:t>04/05/2025</a:t>
             </a:fld>
             <a:endParaRPr lang="en-NL"/>
           </a:p>
@@ -2583,7 +2582,7 @@
           <a:p>
             <a:fld id="{335A01E9-5263-49B0-BF31-C9D0821B9F5E}" type="datetimeFigureOut">
               <a:rPr lang="en-NL" smtClean="0"/>
-              <a:t>03/05/2025</a:t>
+              <a:t>04/05/2025</a:t>
             </a:fld>
             <a:endParaRPr lang="en-NL"/>
           </a:p>
@@ -3022,144 +3021,6 @@
     <p:extLst>
       <p:ext uri="{BB962C8B-B14F-4D97-AF65-F5344CB8AC3E}">
         <p14:creationId xmlns:p14="http://schemas.microsoft.com/office/powerpoint/2010/main" val="75887845"/>
-      </p:ext>
-    </p:extLst>
-  </p:cSld>
-  <p:clrMapOvr>
-    <a:masterClrMapping/>
-  </p:clrMapOvr>
-</p:sld>
-</file>
-
-<file path=ppt/slides/slide10.xml><?xml version="1.0" encoding="utf-8"?>
-<p:sld xmlns:a="http://schemas.openxmlformats.org/drawingml/2006/main" xmlns:r="http://schemas.openxmlformats.org/officeDocument/2006/relationships" xmlns:p="http://schemas.openxmlformats.org/presentationml/2006/main">
-  <p:cSld>
-    <p:spTree>
-      <p:nvGrpSpPr>
-        <p:cNvPr id="1" name="">
-          <a:extLst>
-            <a:ext uri="{FF2B5EF4-FFF2-40B4-BE49-F238E27FC236}">
-              <a16:creationId xmlns:a16="http://schemas.microsoft.com/office/drawing/2014/main" id="{66BC7FFA-FE87-CA85-DEDD-960BFC25ECE9}"/>
-            </a:ext>
-          </a:extLst>
-        </p:cNvPr>
-        <p:cNvGrpSpPr/>
-        <p:nvPr/>
-      </p:nvGrpSpPr>
-      <p:grpSpPr>
-        <a:xfrm>
-          <a:off x="0" y="0"/>
-          <a:ext cx="0" cy="0"/>
-          <a:chOff x="0" y="0"/>
-          <a:chExt cx="0" cy="0"/>
-        </a:xfrm>
-      </p:grpSpPr>
-      <p:pic>
-        <p:nvPicPr>
-          <p:cNvPr id="26" name="Picture 25">
-            <a:extLst>
-              <a:ext uri="{FF2B5EF4-FFF2-40B4-BE49-F238E27FC236}">
-                <a16:creationId xmlns:a16="http://schemas.microsoft.com/office/drawing/2014/main" id="{78E9D0D8-2885-A675-10E7-443354A71468}"/>
-              </a:ext>
-            </a:extLst>
-          </p:cNvPr>
-          <p:cNvPicPr>
-            <a:picLocks noChangeAspect="1"/>
-          </p:cNvPicPr>
-          <p:nvPr/>
-        </p:nvPicPr>
-        <p:blipFill>
-          <a:blip r:embed="rId2"/>
-          <a:stretch>
-            <a:fillRect/>
-          </a:stretch>
-        </p:blipFill>
-        <p:spPr>
-          <a:xfrm>
-            <a:off x="0" y="-2407161"/>
-            <a:ext cx="9906000" cy="2510141"/>
-          </a:xfrm>
-          <a:prstGeom prst="rect">
-            <a:avLst/>
-          </a:prstGeom>
-        </p:spPr>
-      </p:pic>
-      <p:pic>
-        <p:nvPicPr>
-          <p:cNvPr id="30" name="Graphic 29" descr="Badge Follow with solid fill">
-            <a:extLst>
-              <a:ext uri="{FF2B5EF4-FFF2-40B4-BE49-F238E27FC236}">
-                <a16:creationId xmlns:a16="http://schemas.microsoft.com/office/drawing/2014/main" id="{A7A6E2D5-738F-ED61-0543-7762CE392A94}"/>
-              </a:ext>
-            </a:extLst>
-          </p:cNvPr>
-          <p:cNvPicPr>
-            <a:picLocks noChangeAspect="1"/>
-          </p:cNvPicPr>
-          <p:nvPr/>
-        </p:nvPicPr>
-        <p:blipFill>
-          <a:blip r:embed="rId3">
-            <a:extLst>
-              <a:ext uri="{96DAC541-7B7A-43D3-8B79-37D633B846F1}">
-                <asvg:svgBlip xmlns:asvg="http://schemas.microsoft.com/office/drawing/2016/SVG/main" r:embed="rId4"/>
-              </a:ext>
-            </a:extLst>
-          </a:blip>
-          <a:stretch>
-            <a:fillRect/>
-          </a:stretch>
-        </p:blipFill>
-        <p:spPr>
-          <a:xfrm>
-            <a:off x="3513000" y="2709000"/>
-            <a:ext cx="1440000" cy="1440000"/>
-          </a:xfrm>
-          <a:prstGeom prst="rect">
-            <a:avLst/>
-          </a:prstGeom>
-        </p:spPr>
-      </p:pic>
-      <p:pic>
-        <p:nvPicPr>
-          <p:cNvPr id="32" name="Graphic 31" descr="Magic Wand Auto with solid fill">
-            <a:extLst>
-              <a:ext uri="{FF2B5EF4-FFF2-40B4-BE49-F238E27FC236}">
-                <a16:creationId xmlns:a16="http://schemas.microsoft.com/office/drawing/2014/main" id="{AD598D14-58EA-9ED7-9172-C24FDE7380B5}"/>
-              </a:ext>
-            </a:extLst>
-          </p:cNvPr>
-          <p:cNvPicPr>
-            <a:picLocks noChangeAspect="1"/>
-          </p:cNvPicPr>
-          <p:nvPr/>
-        </p:nvPicPr>
-        <p:blipFill>
-          <a:blip r:embed="rId5">
-            <a:extLst>
-              <a:ext uri="{96DAC541-7B7A-43D3-8B79-37D633B846F1}">
-                <asvg:svgBlip xmlns:asvg="http://schemas.microsoft.com/office/drawing/2016/SVG/main" r:embed="rId6"/>
-              </a:ext>
-            </a:extLst>
-          </a:blip>
-          <a:stretch>
-            <a:fillRect/>
-          </a:stretch>
-        </p:blipFill>
-        <p:spPr>
-          <a:xfrm>
-            <a:off x="4953000" y="2709000"/>
-            <a:ext cx="1440000" cy="1440000"/>
-          </a:xfrm>
-          <a:prstGeom prst="rect">
-            <a:avLst/>
-          </a:prstGeom>
-        </p:spPr>
-      </p:pic>
-    </p:spTree>
-    <p:extLst>
-      <p:ext uri="{BB962C8B-B14F-4D97-AF65-F5344CB8AC3E}">
-        <p14:creationId xmlns:p14="http://schemas.microsoft.com/office/powerpoint/2010/main" val="3365089638"/>
       </p:ext>
     </p:extLst>
   </p:cSld>
@@ -5785,2140 +5646,6 @@
         <p:cNvPr id="1" name="">
           <a:extLst>
             <a:ext uri="{FF2B5EF4-FFF2-40B4-BE49-F238E27FC236}">
-              <a16:creationId xmlns:a16="http://schemas.microsoft.com/office/drawing/2014/main" id="{13C8E67B-9122-6BCE-1B46-022FBF8251D6}"/>
-            </a:ext>
-          </a:extLst>
-        </p:cNvPr>
-        <p:cNvGrpSpPr/>
-        <p:nvPr/>
-      </p:nvGrpSpPr>
-      <p:grpSpPr>
-        <a:xfrm>
-          <a:off x="0" y="0"/>
-          <a:ext cx="0" cy="0"/>
-          <a:chOff x="0" y="0"/>
-          <a:chExt cx="0" cy="0"/>
-        </a:xfrm>
-      </p:grpSpPr>
-      <p:grpSp>
-        <p:nvGrpSpPr>
-          <p:cNvPr id="66" name="Group 65">
-            <a:extLst>
-              <a:ext uri="{FF2B5EF4-FFF2-40B4-BE49-F238E27FC236}">
-                <a16:creationId xmlns:a16="http://schemas.microsoft.com/office/drawing/2014/main" id="{E5D2C01C-07F5-3128-B573-DCA91CCC8717}"/>
-              </a:ext>
-            </a:extLst>
-          </p:cNvPr>
-          <p:cNvGrpSpPr/>
-          <p:nvPr/>
-        </p:nvGrpSpPr>
-        <p:grpSpPr>
-          <a:xfrm>
-            <a:off x="1353000" y="549000"/>
-            <a:ext cx="1440000" cy="1440000"/>
-            <a:chOff x="450231" y="2789962"/>
-            <a:chExt cx="1440000" cy="1440000"/>
-          </a:xfrm>
-        </p:grpSpPr>
-        <p:sp>
-          <p:nvSpPr>
-            <p:cNvPr id="35" name="Rectangle 34">
-              <a:extLst>
-                <a:ext uri="{FF2B5EF4-FFF2-40B4-BE49-F238E27FC236}">
-                  <a16:creationId xmlns:a16="http://schemas.microsoft.com/office/drawing/2014/main" id="{4500D0CF-04D5-A576-BA87-BCD7C34E4DC4}"/>
-                </a:ext>
-              </a:extLst>
-            </p:cNvPr>
-            <p:cNvSpPr/>
-            <p:nvPr/>
-          </p:nvSpPr>
-          <p:spPr>
-            <a:xfrm>
-              <a:off x="450231" y="2789962"/>
-              <a:ext cx="1440000" cy="1440000"/>
-            </a:xfrm>
-            <a:prstGeom prst="rect">
-              <a:avLst/>
-            </a:prstGeom>
-            <a:noFill/>
-            <a:ln>
-              <a:noFill/>
-            </a:ln>
-          </p:spPr>
-          <p:style>
-            <a:lnRef idx="2">
-              <a:schemeClr val="accent1">
-                <a:shade val="15000"/>
-              </a:schemeClr>
-            </a:lnRef>
-            <a:fillRef idx="1">
-              <a:schemeClr val="accent1"/>
-            </a:fillRef>
-            <a:effectRef idx="0">
-              <a:schemeClr val="accent1"/>
-            </a:effectRef>
-            <a:fontRef idx="minor">
-              <a:schemeClr val="lt1"/>
-            </a:fontRef>
-          </p:style>
-          <p:txBody>
-            <a:bodyPr rtlCol="0" anchor="ctr"/>
-            <a:lstStyle/>
-            <a:p>
-              <a:pPr algn="ctr"/>
-              <a:endParaRPr lang="en-NL"/>
-            </a:p>
-          </p:txBody>
-        </p:sp>
-        <p:grpSp>
-          <p:nvGrpSpPr>
-            <p:cNvPr id="46" name="Group 45">
-              <a:extLst>
-                <a:ext uri="{FF2B5EF4-FFF2-40B4-BE49-F238E27FC236}">
-                  <a16:creationId xmlns:a16="http://schemas.microsoft.com/office/drawing/2014/main" id="{3D8668F0-B29B-0551-FCFE-16A7806D6FE0}"/>
-                </a:ext>
-              </a:extLst>
-            </p:cNvPr>
-            <p:cNvGrpSpPr/>
-            <p:nvPr/>
-          </p:nvGrpSpPr>
-          <p:grpSpPr>
-            <a:xfrm>
-              <a:off x="658670" y="2989462"/>
-              <a:ext cx="1023122" cy="1041000"/>
-              <a:chOff x="658670" y="3080962"/>
-              <a:chExt cx="1023122" cy="1041000"/>
-            </a:xfrm>
-          </p:grpSpPr>
-          <p:sp>
-            <p:nvSpPr>
-              <p:cNvPr id="40" name="Oval 39">
-                <a:extLst>
-                  <a:ext uri="{FF2B5EF4-FFF2-40B4-BE49-F238E27FC236}">
-                    <a16:creationId xmlns:a16="http://schemas.microsoft.com/office/drawing/2014/main" id="{67FBBD04-FEA1-7472-9A16-329767B06BFE}"/>
-                  </a:ext>
-                </a:extLst>
-              </p:cNvPr>
-              <p:cNvSpPr/>
-              <p:nvPr/>
-            </p:nvSpPr>
-            <p:spPr>
-              <a:xfrm>
-                <a:off x="738231" y="3833962"/>
-                <a:ext cx="288000" cy="288000"/>
-              </a:xfrm>
-              <a:prstGeom prst="ellipse">
-                <a:avLst/>
-              </a:prstGeom>
-              <a:solidFill>
-                <a:schemeClr val="bg1"/>
-              </a:solidFill>
-              <a:ln w="76200">
-                <a:solidFill>
-                  <a:schemeClr val="bg1"/>
-                </a:solidFill>
-              </a:ln>
-            </p:spPr>
-            <p:style>
-              <a:lnRef idx="2">
-                <a:schemeClr val="accent1">
-                  <a:shade val="15000"/>
-                </a:schemeClr>
-              </a:lnRef>
-              <a:fillRef idx="1">
-                <a:schemeClr val="accent1"/>
-              </a:fillRef>
-              <a:effectRef idx="0">
-                <a:schemeClr val="accent1"/>
-              </a:effectRef>
-              <a:fontRef idx="minor">
-                <a:schemeClr val="lt1"/>
-              </a:fontRef>
-            </p:style>
-            <p:txBody>
-              <a:bodyPr rtlCol="0" anchor="ctr"/>
-              <a:lstStyle/>
-              <a:p>
-                <a:pPr algn="ctr"/>
-                <a:endParaRPr lang="en-NL"/>
-              </a:p>
-            </p:txBody>
-          </p:sp>
-          <p:sp>
-            <p:nvSpPr>
-              <p:cNvPr id="41" name="Oval 40">
-                <a:extLst>
-                  <a:ext uri="{FF2B5EF4-FFF2-40B4-BE49-F238E27FC236}">
-                    <a16:creationId xmlns:a16="http://schemas.microsoft.com/office/drawing/2014/main" id="{055C857B-62D5-35A8-CAFB-B02C112DE4B4}"/>
-                  </a:ext>
-                </a:extLst>
-              </p:cNvPr>
-              <p:cNvSpPr/>
-              <p:nvPr/>
-            </p:nvSpPr>
-            <p:spPr>
-              <a:xfrm>
-                <a:off x="1314231" y="3833962"/>
-                <a:ext cx="288000" cy="288000"/>
-              </a:xfrm>
-              <a:prstGeom prst="ellipse">
-                <a:avLst/>
-              </a:prstGeom>
-              <a:noFill/>
-              <a:ln w="76200">
-                <a:solidFill>
-                  <a:schemeClr val="bg1"/>
-                </a:solidFill>
-              </a:ln>
-            </p:spPr>
-            <p:style>
-              <a:lnRef idx="2">
-                <a:schemeClr val="accent1">
-                  <a:shade val="15000"/>
-                </a:schemeClr>
-              </a:lnRef>
-              <a:fillRef idx="1">
-                <a:schemeClr val="accent1"/>
-              </a:fillRef>
-              <a:effectRef idx="0">
-                <a:schemeClr val="accent1"/>
-              </a:effectRef>
-              <a:fontRef idx="minor">
-                <a:schemeClr val="lt1"/>
-              </a:fontRef>
-            </p:style>
-            <p:txBody>
-              <a:bodyPr rtlCol="0" anchor="ctr"/>
-              <a:lstStyle/>
-              <a:p>
-                <a:pPr algn="ctr"/>
-                <a:endParaRPr lang="en-NL"/>
-              </a:p>
-            </p:txBody>
-          </p:sp>
-          <p:cxnSp>
-            <p:nvCxnSpPr>
-              <p:cNvPr id="43" name="Straight Connector 42">
-                <a:extLst>
-                  <a:ext uri="{FF2B5EF4-FFF2-40B4-BE49-F238E27FC236}">
-                    <a16:creationId xmlns:a16="http://schemas.microsoft.com/office/drawing/2014/main" id="{3DCE4C59-0069-E633-71BB-1B86C35F5DC0}"/>
-                  </a:ext>
-                </a:extLst>
-              </p:cNvPr>
-              <p:cNvCxnSpPr>
-                <a:cxnSpLocks/>
-                <a:stCxn id="40" idx="6"/>
-                <a:endCxn id="41" idx="2"/>
-              </p:cNvCxnSpPr>
-              <p:nvPr/>
-            </p:nvCxnSpPr>
-            <p:spPr>
-              <a:xfrm>
-                <a:off x="1026231" y="3977962"/>
-                <a:ext cx="288000" cy="0"/>
-              </a:xfrm>
-              <a:prstGeom prst="line">
-                <a:avLst/>
-              </a:prstGeom>
-              <a:noFill/>
-              <a:ln w="76200">
-                <a:solidFill>
-                  <a:schemeClr val="bg1"/>
-                </a:solidFill>
-              </a:ln>
-            </p:spPr>
-            <p:style>
-              <a:lnRef idx="2">
-                <a:schemeClr val="accent1">
-                  <a:shade val="15000"/>
-                </a:schemeClr>
-              </a:lnRef>
-              <a:fillRef idx="1">
-                <a:schemeClr val="accent1"/>
-              </a:fillRef>
-              <a:effectRef idx="0">
-                <a:schemeClr val="accent1"/>
-              </a:effectRef>
-              <a:fontRef idx="minor">
-                <a:schemeClr val="lt1"/>
-              </a:fontRef>
-            </p:style>
-          </p:cxnSp>
-          <p:sp>
-            <p:nvSpPr>
-              <p:cNvPr id="44" name="Graphic 38" descr="Marker with solid fill">
-                <a:extLst>
-                  <a:ext uri="{FF2B5EF4-FFF2-40B4-BE49-F238E27FC236}">
-                    <a16:creationId xmlns:a16="http://schemas.microsoft.com/office/drawing/2014/main" id="{1E9FE82A-62B1-EFC5-BD96-0BA4CAA9BF65}"/>
-                  </a:ext>
-                </a:extLst>
-              </p:cNvPr>
-              <p:cNvSpPr/>
-              <p:nvPr/>
-            </p:nvSpPr>
-            <p:spPr>
-              <a:xfrm>
-                <a:off x="1242231" y="3080962"/>
-                <a:ext cx="439561" cy="714000"/>
-              </a:xfrm>
-              <a:custGeom>
-                <a:avLst/>
-                <a:gdLst>
-                  <a:gd name="connsiteX0" fmla="*/ 219781 w 439561"/>
-                  <a:gd name="connsiteY0" fmla="*/ 315000 h 714000"/>
-                  <a:gd name="connsiteX1" fmla="*/ 125281 w 439561"/>
-                  <a:gd name="connsiteY1" fmla="*/ 220500 h 714000"/>
-                  <a:gd name="connsiteX2" fmla="*/ 219781 w 439561"/>
-                  <a:gd name="connsiteY2" fmla="*/ 126000 h 714000"/>
-                  <a:gd name="connsiteX3" fmla="*/ 314281 w 439561"/>
-                  <a:gd name="connsiteY3" fmla="*/ 220500 h 714000"/>
-                  <a:gd name="connsiteX4" fmla="*/ 219781 w 439561"/>
-                  <a:gd name="connsiteY4" fmla="*/ 315000 h 714000"/>
-                  <a:gd name="connsiteX5" fmla="*/ 219781 w 439561"/>
-                  <a:gd name="connsiteY5" fmla="*/ 0 h 714000"/>
-                  <a:gd name="connsiteX6" fmla="*/ 38131 w 439561"/>
-                  <a:gd name="connsiteY6" fmla="*/ 96600 h 714000"/>
-                  <a:gd name="connsiteX7" fmla="*/ 15031 w 439561"/>
-                  <a:gd name="connsiteY7" fmla="*/ 301350 h 714000"/>
-                  <a:gd name="connsiteX8" fmla="*/ 114781 w 439561"/>
-                  <a:gd name="connsiteY8" fmla="*/ 521850 h 714000"/>
-                  <a:gd name="connsiteX9" fmla="*/ 200881 w 439561"/>
-                  <a:gd name="connsiteY9" fmla="*/ 702450 h 714000"/>
-                  <a:gd name="connsiteX10" fmla="*/ 219781 w 439561"/>
-                  <a:gd name="connsiteY10" fmla="*/ 714000 h 714000"/>
-                  <a:gd name="connsiteX11" fmla="*/ 238681 w 439561"/>
-                  <a:gd name="connsiteY11" fmla="*/ 702450 h 714000"/>
-                  <a:gd name="connsiteX12" fmla="*/ 324781 w 439561"/>
-                  <a:gd name="connsiteY12" fmla="*/ 521850 h 714000"/>
-                  <a:gd name="connsiteX13" fmla="*/ 424531 w 439561"/>
-                  <a:gd name="connsiteY13" fmla="*/ 301350 h 714000"/>
-                  <a:gd name="connsiteX14" fmla="*/ 401431 w 439561"/>
-                  <a:gd name="connsiteY14" fmla="*/ 96600 h 714000"/>
-                  <a:gd name="connsiteX15" fmla="*/ 219781 w 439561"/>
-                  <a:gd name="connsiteY15" fmla="*/ 0 h 714000"/>
-                </a:gdLst>
-                <a:ahLst/>
-                <a:cxnLst>
-                  <a:cxn ang="0">
-                    <a:pos x="connsiteX0" y="connsiteY0"/>
-                  </a:cxn>
-                  <a:cxn ang="0">
-                    <a:pos x="connsiteX1" y="connsiteY1"/>
-                  </a:cxn>
-                  <a:cxn ang="0">
-                    <a:pos x="connsiteX2" y="connsiteY2"/>
-                  </a:cxn>
-                  <a:cxn ang="0">
-                    <a:pos x="connsiteX3" y="connsiteY3"/>
-                  </a:cxn>
-                  <a:cxn ang="0">
-                    <a:pos x="connsiteX4" y="connsiteY4"/>
-                  </a:cxn>
-                  <a:cxn ang="0">
-                    <a:pos x="connsiteX5" y="connsiteY5"/>
-                  </a:cxn>
-                  <a:cxn ang="0">
-                    <a:pos x="connsiteX6" y="connsiteY6"/>
-                  </a:cxn>
-                  <a:cxn ang="0">
-                    <a:pos x="connsiteX7" y="connsiteY7"/>
-                  </a:cxn>
-                  <a:cxn ang="0">
-                    <a:pos x="connsiteX8" y="connsiteY8"/>
-                  </a:cxn>
-                  <a:cxn ang="0">
-                    <a:pos x="connsiteX9" y="connsiteY9"/>
-                  </a:cxn>
-                  <a:cxn ang="0">
-                    <a:pos x="connsiteX10" y="connsiteY10"/>
-                  </a:cxn>
-                  <a:cxn ang="0">
-                    <a:pos x="connsiteX11" y="connsiteY11"/>
-                  </a:cxn>
-                  <a:cxn ang="0">
-                    <a:pos x="connsiteX12" y="connsiteY12"/>
-                  </a:cxn>
-                  <a:cxn ang="0">
-                    <a:pos x="connsiteX13" y="connsiteY13"/>
-                  </a:cxn>
-                  <a:cxn ang="0">
-                    <a:pos x="connsiteX14" y="connsiteY14"/>
-                  </a:cxn>
-                  <a:cxn ang="0">
-                    <a:pos x="connsiteX15" y="connsiteY15"/>
-                  </a:cxn>
-                </a:cxnLst>
-                <a:rect l="l" t="t" r="r" b="b"/>
-                <a:pathLst>
-                  <a:path w="439561" h="714000">
-                    <a:moveTo>
-                      <a:pt x="219781" y="315000"/>
-                    </a:moveTo>
-                    <a:cubicBezTo>
-                      <a:pt x="167281" y="315000"/>
-                      <a:pt x="125281" y="273000"/>
-                      <a:pt x="125281" y="220500"/>
-                    </a:cubicBezTo>
-                    <a:cubicBezTo>
-                      <a:pt x="125281" y="168000"/>
-                      <a:pt x="167281" y="126000"/>
-                      <a:pt x="219781" y="126000"/>
-                    </a:cubicBezTo>
-                    <a:cubicBezTo>
-                      <a:pt x="272281" y="126000"/>
-                      <a:pt x="314281" y="168000"/>
-                      <a:pt x="314281" y="220500"/>
-                    </a:cubicBezTo>
-                    <a:cubicBezTo>
-                      <a:pt x="314281" y="273000"/>
-                      <a:pt x="272281" y="315000"/>
-                      <a:pt x="219781" y="315000"/>
-                    </a:cubicBezTo>
-                    <a:close/>
-                    <a:moveTo>
-                      <a:pt x="219781" y="0"/>
-                    </a:moveTo>
-                    <a:cubicBezTo>
-                      <a:pt x="147331" y="0"/>
-                      <a:pt x="79081" y="35700"/>
-                      <a:pt x="38131" y="96600"/>
-                    </a:cubicBezTo>
-                    <a:cubicBezTo>
-                      <a:pt x="-2819" y="156450"/>
-                      <a:pt x="-11219" y="233100"/>
-                      <a:pt x="15031" y="301350"/>
-                    </a:cubicBezTo>
-                    <a:lnTo>
-                      <a:pt x="114781" y="521850"/>
-                    </a:lnTo>
-                    <a:lnTo>
-                      <a:pt x="200881" y="702450"/>
-                    </a:lnTo>
-                    <a:cubicBezTo>
-                      <a:pt x="204031" y="709800"/>
-                      <a:pt x="211381" y="714000"/>
-                      <a:pt x="219781" y="714000"/>
-                    </a:cubicBezTo>
-                    <a:cubicBezTo>
-                      <a:pt x="228181" y="714000"/>
-                      <a:pt x="235531" y="709800"/>
-                      <a:pt x="238681" y="702450"/>
-                    </a:cubicBezTo>
-                    <a:lnTo>
-                      <a:pt x="324781" y="521850"/>
-                    </a:lnTo>
-                    <a:lnTo>
-                      <a:pt x="424531" y="301350"/>
-                    </a:lnTo>
-                    <a:cubicBezTo>
-                      <a:pt x="450781" y="233100"/>
-                      <a:pt x="442381" y="156450"/>
-                      <a:pt x="401431" y="96600"/>
-                    </a:cubicBezTo>
-                    <a:cubicBezTo>
-                      <a:pt x="360481" y="35700"/>
-                      <a:pt x="292231" y="0"/>
-                      <a:pt x="219781" y="0"/>
-                    </a:cubicBezTo>
-                    <a:close/>
-                  </a:path>
-                </a:pathLst>
-              </a:custGeom>
-              <a:solidFill>
-                <a:schemeClr val="bg1"/>
-              </a:solidFill>
-              <a:ln w="10418" cap="flat">
-                <a:noFill/>
-                <a:prstDash val="solid"/>
-                <a:miter/>
-              </a:ln>
-            </p:spPr>
-            <p:txBody>
-              <a:bodyPr rtlCol="0" anchor="ctr"/>
-              <a:lstStyle/>
-              <a:p>
-                <a:endParaRPr lang="en-NL"/>
-              </a:p>
-            </p:txBody>
-          </p:sp>
-          <p:sp>
-            <p:nvSpPr>
-              <p:cNvPr id="45" name="Graphic 35" descr="Marker with solid fill">
-                <a:extLst>
-                  <a:ext uri="{FF2B5EF4-FFF2-40B4-BE49-F238E27FC236}">
-                    <a16:creationId xmlns:a16="http://schemas.microsoft.com/office/drawing/2014/main" id="{689E0464-4877-CFF3-892F-F6797B6DAE6E}"/>
-                  </a:ext>
-                </a:extLst>
-              </p:cNvPr>
-              <p:cNvSpPr/>
-              <p:nvPr/>
-            </p:nvSpPr>
-            <p:spPr>
-              <a:xfrm>
-                <a:off x="658670" y="3080962"/>
-                <a:ext cx="439561" cy="714000"/>
-              </a:xfrm>
-              <a:custGeom>
-                <a:avLst/>
-                <a:gdLst>
-                  <a:gd name="connsiteX0" fmla="*/ 219781 w 439561"/>
-                  <a:gd name="connsiteY0" fmla="*/ 315000 h 714000"/>
-                  <a:gd name="connsiteX1" fmla="*/ 125281 w 439561"/>
-                  <a:gd name="connsiteY1" fmla="*/ 220500 h 714000"/>
-                  <a:gd name="connsiteX2" fmla="*/ 219781 w 439561"/>
-                  <a:gd name="connsiteY2" fmla="*/ 126000 h 714000"/>
-                  <a:gd name="connsiteX3" fmla="*/ 314281 w 439561"/>
-                  <a:gd name="connsiteY3" fmla="*/ 220500 h 714000"/>
-                  <a:gd name="connsiteX4" fmla="*/ 219781 w 439561"/>
-                  <a:gd name="connsiteY4" fmla="*/ 315000 h 714000"/>
-                  <a:gd name="connsiteX5" fmla="*/ 219781 w 439561"/>
-                  <a:gd name="connsiteY5" fmla="*/ 0 h 714000"/>
-                  <a:gd name="connsiteX6" fmla="*/ 38131 w 439561"/>
-                  <a:gd name="connsiteY6" fmla="*/ 96600 h 714000"/>
-                  <a:gd name="connsiteX7" fmla="*/ 15031 w 439561"/>
-                  <a:gd name="connsiteY7" fmla="*/ 301350 h 714000"/>
-                  <a:gd name="connsiteX8" fmla="*/ 114781 w 439561"/>
-                  <a:gd name="connsiteY8" fmla="*/ 521850 h 714000"/>
-                  <a:gd name="connsiteX9" fmla="*/ 200881 w 439561"/>
-                  <a:gd name="connsiteY9" fmla="*/ 702450 h 714000"/>
-                  <a:gd name="connsiteX10" fmla="*/ 219781 w 439561"/>
-                  <a:gd name="connsiteY10" fmla="*/ 714000 h 714000"/>
-                  <a:gd name="connsiteX11" fmla="*/ 238681 w 439561"/>
-                  <a:gd name="connsiteY11" fmla="*/ 702450 h 714000"/>
-                  <a:gd name="connsiteX12" fmla="*/ 324781 w 439561"/>
-                  <a:gd name="connsiteY12" fmla="*/ 521850 h 714000"/>
-                  <a:gd name="connsiteX13" fmla="*/ 424531 w 439561"/>
-                  <a:gd name="connsiteY13" fmla="*/ 301350 h 714000"/>
-                  <a:gd name="connsiteX14" fmla="*/ 401431 w 439561"/>
-                  <a:gd name="connsiteY14" fmla="*/ 96600 h 714000"/>
-                  <a:gd name="connsiteX15" fmla="*/ 219781 w 439561"/>
-                  <a:gd name="connsiteY15" fmla="*/ 0 h 714000"/>
-                </a:gdLst>
-                <a:ahLst/>
-                <a:cxnLst>
-                  <a:cxn ang="0">
-                    <a:pos x="connsiteX0" y="connsiteY0"/>
-                  </a:cxn>
-                  <a:cxn ang="0">
-                    <a:pos x="connsiteX1" y="connsiteY1"/>
-                  </a:cxn>
-                  <a:cxn ang="0">
-                    <a:pos x="connsiteX2" y="connsiteY2"/>
-                  </a:cxn>
-                  <a:cxn ang="0">
-                    <a:pos x="connsiteX3" y="connsiteY3"/>
-                  </a:cxn>
-                  <a:cxn ang="0">
-                    <a:pos x="connsiteX4" y="connsiteY4"/>
-                  </a:cxn>
-                  <a:cxn ang="0">
-                    <a:pos x="connsiteX5" y="connsiteY5"/>
-                  </a:cxn>
-                  <a:cxn ang="0">
-                    <a:pos x="connsiteX6" y="connsiteY6"/>
-                  </a:cxn>
-                  <a:cxn ang="0">
-                    <a:pos x="connsiteX7" y="connsiteY7"/>
-                  </a:cxn>
-                  <a:cxn ang="0">
-                    <a:pos x="connsiteX8" y="connsiteY8"/>
-                  </a:cxn>
-                  <a:cxn ang="0">
-                    <a:pos x="connsiteX9" y="connsiteY9"/>
-                  </a:cxn>
-                  <a:cxn ang="0">
-                    <a:pos x="connsiteX10" y="connsiteY10"/>
-                  </a:cxn>
-                  <a:cxn ang="0">
-                    <a:pos x="connsiteX11" y="connsiteY11"/>
-                  </a:cxn>
-                  <a:cxn ang="0">
-                    <a:pos x="connsiteX12" y="connsiteY12"/>
-                  </a:cxn>
-                  <a:cxn ang="0">
-                    <a:pos x="connsiteX13" y="connsiteY13"/>
-                  </a:cxn>
-                  <a:cxn ang="0">
-                    <a:pos x="connsiteX14" y="connsiteY14"/>
-                  </a:cxn>
-                  <a:cxn ang="0">
-                    <a:pos x="connsiteX15" y="connsiteY15"/>
-                  </a:cxn>
-                </a:cxnLst>
-                <a:rect l="l" t="t" r="r" b="b"/>
-                <a:pathLst>
-                  <a:path w="439561" h="714000">
-                    <a:moveTo>
-                      <a:pt x="219781" y="315000"/>
-                    </a:moveTo>
-                    <a:cubicBezTo>
-                      <a:pt x="167281" y="315000"/>
-                      <a:pt x="125281" y="273000"/>
-                      <a:pt x="125281" y="220500"/>
-                    </a:cubicBezTo>
-                    <a:cubicBezTo>
-                      <a:pt x="125281" y="168000"/>
-                      <a:pt x="167281" y="126000"/>
-                      <a:pt x="219781" y="126000"/>
-                    </a:cubicBezTo>
-                    <a:cubicBezTo>
-                      <a:pt x="272281" y="126000"/>
-                      <a:pt x="314281" y="168000"/>
-                      <a:pt x="314281" y="220500"/>
-                    </a:cubicBezTo>
-                    <a:cubicBezTo>
-                      <a:pt x="314281" y="273000"/>
-                      <a:pt x="272281" y="315000"/>
-                      <a:pt x="219781" y="315000"/>
-                    </a:cubicBezTo>
-                    <a:close/>
-                    <a:moveTo>
-                      <a:pt x="219781" y="0"/>
-                    </a:moveTo>
-                    <a:cubicBezTo>
-                      <a:pt x="147331" y="0"/>
-                      <a:pt x="79081" y="35700"/>
-                      <a:pt x="38131" y="96600"/>
-                    </a:cubicBezTo>
-                    <a:cubicBezTo>
-                      <a:pt x="-2819" y="156450"/>
-                      <a:pt x="-11219" y="233100"/>
-                      <a:pt x="15031" y="301350"/>
-                    </a:cubicBezTo>
-                    <a:lnTo>
-                      <a:pt x="114781" y="521850"/>
-                    </a:lnTo>
-                    <a:lnTo>
-                      <a:pt x="200881" y="702450"/>
-                    </a:lnTo>
-                    <a:cubicBezTo>
-                      <a:pt x="204031" y="709800"/>
-                      <a:pt x="211381" y="714000"/>
-                      <a:pt x="219781" y="714000"/>
-                    </a:cubicBezTo>
-                    <a:cubicBezTo>
-                      <a:pt x="228181" y="714000"/>
-                      <a:pt x="235531" y="709800"/>
-                      <a:pt x="238681" y="702450"/>
-                    </a:cubicBezTo>
-                    <a:lnTo>
-                      <a:pt x="324781" y="521850"/>
-                    </a:lnTo>
-                    <a:lnTo>
-                      <a:pt x="424531" y="301350"/>
-                    </a:lnTo>
-                    <a:cubicBezTo>
-                      <a:pt x="450781" y="233100"/>
-                      <a:pt x="442381" y="156450"/>
-                      <a:pt x="401431" y="96600"/>
-                    </a:cubicBezTo>
-                    <a:cubicBezTo>
-                      <a:pt x="360481" y="35700"/>
-                      <a:pt x="292231" y="0"/>
-                      <a:pt x="219781" y="0"/>
-                    </a:cubicBezTo>
-                    <a:close/>
-                  </a:path>
-                </a:pathLst>
-              </a:custGeom>
-              <a:solidFill>
-                <a:schemeClr val="bg1"/>
-              </a:solidFill>
-              <a:ln w="10418" cap="flat">
-                <a:noFill/>
-                <a:prstDash val="solid"/>
-                <a:miter/>
-              </a:ln>
-            </p:spPr>
-            <p:txBody>
-              <a:bodyPr rtlCol="0" anchor="ctr"/>
-              <a:lstStyle/>
-              <a:p>
-                <a:endParaRPr lang="en-NL"/>
-              </a:p>
-            </p:txBody>
-          </p:sp>
-        </p:grpSp>
-      </p:grpSp>
-      <p:grpSp>
-        <p:nvGrpSpPr>
-          <p:cNvPr id="76" name="Group 75">
-            <a:extLst>
-              <a:ext uri="{FF2B5EF4-FFF2-40B4-BE49-F238E27FC236}">
-                <a16:creationId xmlns:a16="http://schemas.microsoft.com/office/drawing/2014/main" id="{3EF07B0A-7A0D-17A9-7554-F2995C25C2B4}"/>
-              </a:ext>
-            </a:extLst>
-          </p:cNvPr>
-          <p:cNvGrpSpPr/>
-          <p:nvPr/>
-        </p:nvGrpSpPr>
-        <p:grpSpPr>
-          <a:xfrm>
-            <a:off x="4233000" y="549000"/>
-            <a:ext cx="1440000" cy="1440000"/>
-            <a:chOff x="3330231" y="2789962"/>
-            <a:chExt cx="1440000" cy="1440000"/>
-          </a:xfrm>
-        </p:grpSpPr>
-        <p:pic>
-          <p:nvPicPr>
-            <p:cNvPr id="23" name="Graphic 22" descr="Thermometer with solid fill">
-              <a:extLst>
-                <a:ext uri="{FF2B5EF4-FFF2-40B4-BE49-F238E27FC236}">
-                  <a16:creationId xmlns:a16="http://schemas.microsoft.com/office/drawing/2014/main" id="{5CFF2B7D-EB7E-E81B-97E6-142535436CCF}"/>
-                </a:ext>
-              </a:extLst>
-            </p:cNvPr>
-            <p:cNvPicPr>
-              <a:picLocks noChangeAspect="1"/>
-            </p:cNvPicPr>
-            <p:nvPr/>
-          </p:nvPicPr>
-          <p:blipFill>
-            <a:blip r:embed="rId2">
-              <a:extLst>
-                <a:ext uri="{96DAC541-7B7A-43D3-8B79-37D633B846F1}">
-                  <asvg:svgBlip xmlns:asvg="http://schemas.microsoft.com/office/drawing/2016/SVG/main" r:embed="rId3"/>
-                </a:ext>
-              </a:extLst>
-            </a:blip>
-            <a:stretch>
-              <a:fillRect/>
-            </a:stretch>
-          </p:blipFill>
-          <p:spPr>
-            <a:xfrm>
-              <a:off x="3474231" y="2933962"/>
-              <a:ext cx="1152000" cy="1152000"/>
-            </a:xfrm>
-            <a:prstGeom prst="rect">
-              <a:avLst/>
-            </a:prstGeom>
-          </p:spPr>
-        </p:pic>
-        <p:sp>
-          <p:nvSpPr>
-            <p:cNvPr id="75" name="Rectangle 74">
-              <a:extLst>
-                <a:ext uri="{FF2B5EF4-FFF2-40B4-BE49-F238E27FC236}">
-                  <a16:creationId xmlns:a16="http://schemas.microsoft.com/office/drawing/2014/main" id="{E96DDC65-C335-23FC-95DA-2573EFF95BA2}"/>
-                </a:ext>
-              </a:extLst>
-            </p:cNvPr>
-            <p:cNvSpPr/>
-            <p:nvPr/>
-          </p:nvSpPr>
-          <p:spPr>
-            <a:xfrm>
-              <a:off x="3330231" y="2789962"/>
-              <a:ext cx="1440000" cy="1440000"/>
-            </a:xfrm>
-            <a:prstGeom prst="rect">
-              <a:avLst/>
-            </a:prstGeom>
-            <a:noFill/>
-            <a:ln>
-              <a:noFill/>
-            </a:ln>
-          </p:spPr>
-          <p:style>
-            <a:lnRef idx="2">
-              <a:schemeClr val="accent1">
-                <a:shade val="15000"/>
-              </a:schemeClr>
-            </a:lnRef>
-            <a:fillRef idx="1">
-              <a:schemeClr val="accent1"/>
-            </a:fillRef>
-            <a:effectRef idx="0">
-              <a:schemeClr val="accent1"/>
-            </a:effectRef>
-            <a:fontRef idx="minor">
-              <a:schemeClr val="lt1"/>
-            </a:fontRef>
-          </p:style>
-          <p:txBody>
-            <a:bodyPr rtlCol="0" anchor="ctr"/>
-            <a:lstStyle/>
-            <a:p>
-              <a:pPr algn="ctr"/>
-              <a:endParaRPr lang="en-NL" dirty="0"/>
-            </a:p>
-          </p:txBody>
-        </p:sp>
-      </p:grpSp>
-      <p:grpSp>
-        <p:nvGrpSpPr>
-          <p:cNvPr id="80" name="Group 79">
-            <a:extLst>
-              <a:ext uri="{FF2B5EF4-FFF2-40B4-BE49-F238E27FC236}">
-                <a16:creationId xmlns:a16="http://schemas.microsoft.com/office/drawing/2014/main" id="{6012090C-9E84-F591-7C8E-A386FC8FE48E}"/>
-              </a:ext>
-            </a:extLst>
-          </p:cNvPr>
-          <p:cNvGrpSpPr/>
-          <p:nvPr/>
-        </p:nvGrpSpPr>
-        <p:grpSpPr>
-          <a:xfrm>
-            <a:off x="5673000" y="549000"/>
-            <a:ext cx="1440000" cy="1440000"/>
-            <a:chOff x="4770231" y="2789962"/>
-            <a:chExt cx="1440000" cy="1440000"/>
-          </a:xfrm>
-        </p:grpSpPr>
-        <p:sp>
-          <p:nvSpPr>
-            <p:cNvPr id="50" name="Arc 49">
-              <a:extLst>
-                <a:ext uri="{FF2B5EF4-FFF2-40B4-BE49-F238E27FC236}">
-                  <a16:creationId xmlns:a16="http://schemas.microsoft.com/office/drawing/2014/main" id="{F35F4F86-6AE7-510F-DE42-BC64BA125F35}"/>
-                </a:ext>
-              </a:extLst>
-            </p:cNvPr>
-            <p:cNvSpPr/>
-            <p:nvPr/>
-          </p:nvSpPr>
-          <p:spPr>
-            <a:xfrm flipH="1">
-              <a:off x="5238230" y="3257962"/>
-              <a:ext cx="504000" cy="504000"/>
-            </a:xfrm>
-            <a:prstGeom prst="arc">
-              <a:avLst>
-                <a:gd name="adj1" fmla="val 16200000"/>
-                <a:gd name="adj2" fmla="val 11947890"/>
-              </a:avLst>
-            </a:prstGeom>
-            <a:noFill/>
-            <a:ln w="76200">
-              <a:solidFill>
-                <a:schemeClr val="bg1"/>
-              </a:solidFill>
-            </a:ln>
-          </p:spPr>
-          <p:style>
-            <a:lnRef idx="2">
-              <a:schemeClr val="accent1">
-                <a:shade val="15000"/>
-              </a:schemeClr>
-            </a:lnRef>
-            <a:fillRef idx="1">
-              <a:schemeClr val="accent1"/>
-            </a:fillRef>
-            <a:effectRef idx="0">
-              <a:schemeClr val="accent1"/>
-            </a:effectRef>
-            <a:fontRef idx="minor">
-              <a:schemeClr val="lt1"/>
-            </a:fontRef>
-          </p:style>
-          <p:txBody>
-            <a:bodyPr rtlCol="0" anchor="ctr"/>
-            <a:lstStyle/>
-            <a:p>
-              <a:pPr algn="ctr"/>
-              <a:endParaRPr lang="en-NL"/>
-            </a:p>
-          </p:txBody>
-        </p:sp>
-        <p:sp>
-          <p:nvSpPr>
-            <p:cNvPr id="62" name="Oval 61">
-              <a:extLst>
-                <a:ext uri="{FF2B5EF4-FFF2-40B4-BE49-F238E27FC236}">
-                  <a16:creationId xmlns:a16="http://schemas.microsoft.com/office/drawing/2014/main" id="{927E2182-2E9F-C437-DDA1-3B3A73A7B068}"/>
-                </a:ext>
-              </a:extLst>
-            </p:cNvPr>
-            <p:cNvSpPr/>
-            <p:nvPr/>
-          </p:nvSpPr>
-          <p:spPr>
-            <a:xfrm>
-              <a:off x="5346231" y="3365962"/>
-              <a:ext cx="288000" cy="288000"/>
-            </a:xfrm>
-            <a:prstGeom prst="ellipse">
-              <a:avLst/>
-            </a:prstGeom>
-            <a:solidFill>
-              <a:schemeClr val="bg1"/>
-            </a:solidFill>
-            <a:ln w="76200">
-              <a:noFill/>
-            </a:ln>
-          </p:spPr>
-          <p:style>
-            <a:lnRef idx="2">
-              <a:schemeClr val="accent1">
-                <a:shade val="15000"/>
-              </a:schemeClr>
-            </a:lnRef>
-            <a:fillRef idx="1">
-              <a:schemeClr val="accent1"/>
-            </a:fillRef>
-            <a:effectRef idx="0">
-              <a:schemeClr val="accent1"/>
-            </a:effectRef>
-            <a:fontRef idx="minor">
-              <a:schemeClr val="lt1"/>
-            </a:fontRef>
-          </p:style>
-          <p:txBody>
-            <a:bodyPr rtlCol="0" anchor="ctr"/>
-            <a:lstStyle/>
-            <a:p>
-              <a:pPr algn="ctr"/>
-              <a:endParaRPr lang="en-NL"/>
-            </a:p>
-          </p:txBody>
-        </p:sp>
-        <p:sp>
-          <p:nvSpPr>
-            <p:cNvPr id="71" name="Arc 70">
-              <a:extLst>
-                <a:ext uri="{FF2B5EF4-FFF2-40B4-BE49-F238E27FC236}">
-                  <a16:creationId xmlns:a16="http://schemas.microsoft.com/office/drawing/2014/main" id="{EF13D8C1-F925-07D7-E25C-2BFC2EAB85C6}"/>
-                </a:ext>
-              </a:extLst>
-            </p:cNvPr>
-            <p:cNvSpPr/>
-            <p:nvPr/>
-          </p:nvSpPr>
-          <p:spPr>
-            <a:xfrm flipH="1">
-              <a:off x="5094231" y="3113962"/>
-              <a:ext cx="792000" cy="792000"/>
-            </a:xfrm>
-            <a:prstGeom prst="arc">
-              <a:avLst>
-                <a:gd name="adj1" fmla="val 16200000"/>
-                <a:gd name="adj2" fmla="val 11857800"/>
-              </a:avLst>
-            </a:prstGeom>
-            <a:noFill/>
-            <a:ln w="76200">
-              <a:solidFill>
-                <a:schemeClr val="bg1"/>
-              </a:solidFill>
-            </a:ln>
-          </p:spPr>
-          <p:style>
-            <a:lnRef idx="2">
-              <a:schemeClr val="accent1">
-                <a:shade val="15000"/>
-              </a:schemeClr>
-            </a:lnRef>
-            <a:fillRef idx="1">
-              <a:schemeClr val="accent1"/>
-            </a:fillRef>
-            <a:effectRef idx="0">
-              <a:schemeClr val="accent1"/>
-            </a:effectRef>
-            <a:fontRef idx="minor">
-              <a:schemeClr val="lt1"/>
-            </a:fontRef>
-          </p:style>
-          <p:txBody>
-            <a:bodyPr rtlCol="0" anchor="ctr"/>
-            <a:lstStyle/>
-            <a:p>
-              <a:pPr algn="ctr"/>
-              <a:endParaRPr lang="en-NL"/>
-            </a:p>
-          </p:txBody>
-        </p:sp>
-        <p:cxnSp>
-          <p:nvCxnSpPr>
-            <p:cNvPr id="72" name="Straight Connector 71">
-              <a:extLst>
-                <a:ext uri="{FF2B5EF4-FFF2-40B4-BE49-F238E27FC236}">
-                  <a16:creationId xmlns:a16="http://schemas.microsoft.com/office/drawing/2014/main" id="{DDB6C2CA-AEFB-1465-8374-323C3DCE8B30}"/>
-                </a:ext>
-              </a:extLst>
-            </p:cNvPr>
-            <p:cNvCxnSpPr>
-              <a:cxnSpLocks/>
-            </p:cNvCxnSpPr>
-            <p:nvPr/>
-          </p:nvCxnSpPr>
-          <p:spPr>
-            <a:xfrm flipV="1">
-              <a:off x="5490231" y="3077962"/>
-              <a:ext cx="0" cy="432000"/>
-            </a:xfrm>
-            <a:prstGeom prst="line">
-              <a:avLst/>
-            </a:prstGeom>
-            <a:noFill/>
-            <a:ln w="76200">
-              <a:solidFill>
-                <a:schemeClr val="bg1"/>
-              </a:solidFill>
-            </a:ln>
-          </p:spPr>
-          <p:style>
-            <a:lnRef idx="2">
-              <a:schemeClr val="accent1">
-                <a:shade val="15000"/>
-              </a:schemeClr>
-            </a:lnRef>
-            <a:fillRef idx="1">
-              <a:schemeClr val="accent1"/>
-            </a:fillRef>
-            <a:effectRef idx="0">
-              <a:schemeClr val="accent1"/>
-            </a:effectRef>
-            <a:fontRef idx="minor">
-              <a:schemeClr val="lt1"/>
-            </a:fontRef>
-          </p:style>
-        </p:cxnSp>
-        <p:sp>
-          <p:nvSpPr>
-            <p:cNvPr id="79" name="Rectangle 78">
-              <a:extLst>
-                <a:ext uri="{FF2B5EF4-FFF2-40B4-BE49-F238E27FC236}">
-                  <a16:creationId xmlns:a16="http://schemas.microsoft.com/office/drawing/2014/main" id="{CF9BFF8B-057F-77A2-51A1-DF6287CC054D}"/>
-                </a:ext>
-              </a:extLst>
-            </p:cNvPr>
-            <p:cNvSpPr/>
-            <p:nvPr/>
-          </p:nvSpPr>
-          <p:spPr>
-            <a:xfrm>
-              <a:off x="4770231" y="2789962"/>
-              <a:ext cx="1440000" cy="1440000"/>
-            </a:xfrm>
-            <a:prstGeom prst="rect">
-              <a:avLst/>
-            </a:prstGeom>
-            <a:noFill/>
-            <a:ln>
-              <a:noFill/>
-            </a:ln>
-          </p:spPr>
-          <p:style>
-            <a:lnRef idx="2">
-              <a:schemeClr val="accent1">
-                <a:shade val="15000"/>
-              </a:schemeClr>
-            </a:lnRef>
-            <a:fillRef idx="1">
-              <a:schemeClr val="accent1"/>
-            </a:fillRef>
-            <a:effectRef idx="0">
-              <a:schemeClr val="accent1"/>
-            </a:effectRef>
-            <a:fontRef idx="minor">
-              <a:schemeClr val="lt1"/>
-            </a:fontRef>
-          </p:style>
-          <p:txBody>
-            <a:bodyPr rtlCol="0" anchor="ctr"/>
-            <a:lstStyle/>
-            <a:p>
-              <a:pPr algn="ctr"/>
-              <a:endParaRPr lang="en-NL"/>
-            </a:p>
-          </p:txBody>
-        </p:sp>
-      </p:grpSp>
-      <p:grpSp>
-        <p:nvGrpSpPr>
-          <p:cNvPr id="82" name="Group 81">
-            <a:extLst>
-              <a:ext uri="{FF2B5EF4-FFF2-40B4-BE49-F238E27FC236}">
-                <a16:creationId xmlns:a16="http://schemas.microsoft.com/office/drawing/2014/main" id="{445C22AD-1852-746A-C3B1-4592600C38BE}"/>
-              </a:ext>
-            </a:extLst>
-          </p:cNvPr>
-          <p:cNvGrpSpPr/>
-          <p:nvPr/>
-        </p:nvGrpSpPr>
-        <p:grpSpPr>
-          <a:xfrm>
-            <a:off x="7113000" y="549000"/>
-            <a:ext cx="1440000" cy="1440000"/>
-            <a:chOff x="6210231" y="2789962"/>
-            <a:chExt cx="1440000" cy="1440000"/>
-          </a:xfrm>
-        </p:grpSpPr>
-        <p:pic>
-          <p:nvPicPr>
-            <p:cNvPr id="21" name="Graphic 20" descr="Camera with solid fill">
-              <a:extLst>
-                <a:ext uri="{FF2B5EF4-FFF2-40B4-BE49-F238E27FC236}">
-                  <a16:creationId xmlns:a16="http://schemas.microsoft.com/office/drawing/2014/main" id="{166FC6C8-F45E-B12E-A945-EA4C9C41927F}"/>
-                </a:ext>
-              </a:extLst>
-            </p:cNvPr>
-            <p:cNvPicPr>
-              <a:picLocks noChangeAspect="1"/>
-            </p:cNvPicPr>
-            <p:nvPr/>
-          </p:nvPicPr>
-          <p:blipFill>
-            <a:blip r:embed="rId4">
-              <a:extLst>
-                <a:ext uri="{96DAC541-7B7A-43D3-8B79-37D633B846F1}">
-                  <asvg:svgBlip xmlns:asvg="http://schemas.microsoft.com/office/drawing/2016/SVG/main" r:embed="rId5"/>
-                </a:ext>
-              </a:extLst>
-            </a:blip>
-            <a:stretch>
-              <a:fillRect/>
-            </a:stretch>
-          </p:blipFill>
-          <p:spPr>
-            <a:xfrm>
-              <a:off x="6354231" y="2933962"/>
-              <a:ext cx="1152000" cy="1152000"/>
-            </a:xfrm>
-            <a:prstGeom prst="rect">
-              <a:avLst/>
-            </a:prstGeom>
-          </p:spPr>
-        </p:pic>
-        <p:sp>
-          <p:nvSpPr>
-            <p:cNvPr id="81" name="Rectangle 80">
-              <a:extLst>
-                <a:ext uri="{FF2B5EF4-FFF2-40B4-BE49-F238E27FC236}">
-                  <a16:creationId xmlns:a16="http://schemas.microsoft.com/office/drawing/2014/main" id="{D3D550A5-5354-886C-CC26-FF6B5A58E368}"/>
-                </a:ext>
-              </a:extLst>
-            </p:cNvPr>
-            <p:cNvSpPr/>
-            <p:nvPr/>
-          </p:nvSpPr>
-          <p:spPr>
-            <a:xfrm>
-              <a:off x="6210231" y="2789962"/>
-              <a:ext cx="1440000" cy="1440000"/>
-            </a:xfrm>
-            <a:prstGeom prst="rect">
-              <a:avLst/>
-            </a:prstGeom>
-            <a:noFill/>
-            <a:ln>
-              <a:noFill/>
-            </a:ln>
-          </p:spPr>
-          <p:style>
-            <a:lnRef idx="2">
-              <a:schemeClr val="accent1">
-                <a:shade val="15000"/>
-              </a:schemeClr>
-            </a:lnRef>
-            <a:fillRef idx="1">
-              <a:schemeClr val="accent1"/>
-            </a:fillRef>
-            <a:effectRef idx="0">
-              <a:schemeClr val="accent1"/>
-            </a:effectRef>
-            <a:fontRef idx="minor">
-              <a:schemeClr val="lt1"/>
-            </a:fontRef>
-          </p:style>
-          <p:txBody>
-            <a:bodyPr rtlCol="0" anchor="ctr"/>
-            <a:lstStyle/>
-            <a:p>
-              <a:pPr algn="ctr"/>
-              <a:endParaRPr lang="en-NL"/>
-            </a:p>
-          </p:txBody>
-        </p:sp>
-      </p:grpSp>
-      <p:grpSp>
-        <p:nvGrpSpPr>
-          <p:cNvPr id="84" name="Group 83">
-            <a:extLst>
-              <a:ext uri="{FF2B5EF4-FFF2-40B4-BE49-F238E27FC236}">
-                <a16:creationId xmlns:a16="http://schemas.microsoft.com/office/drawing/2014/main" id="{184998A1-09C2-6192-5DDC-09A0647CAFD2}"/>
-              </a:ext>
-            </a:extLst>
-          </p:cNvPr>
-          <p:cNvGrpSpPr/>
-          <p:nvPr/>
-        </p:nvGrpSpPr>
-        <p:grpSpPr>
-          <a:xfrm>
-            <a:off x="2793000" y="549000"/>
-            <a:ext cx="1440000" cy="1440000"/>
-            <a:chOff x="1890231" y="2789962"/>
-            <a:chExt cx="1440000" cy="1440000"/>
-          </a:xfrm>
-        </p:grpSpPr>
-        <p:grpSp>
-          <p:nvGrpSpPr>
-            <p:cNvPr id="48" name="Group 47">
-              <a:extLst>
-                <a:ext uri="{FF2B5EF4-FFF2-40B4-BE49-F238E27FC236}">
-                  <a16:creationId xmlns:a16="http://schemas.microsoft.com/office/drawing/2014/main" id="{C24700BA-850C-7DD9-40DF-0E93F662A3BF}"/>
-                </a:ext>
-              </a:extLst>
-            </p:cNvPr>
-            <p:cNvGrpSpPr/>
-            <p:nvPr/>
-          </p:nvGrpSpPr>
-          <p:grpSpPr>
-            <a:xfrm>
-              <a:off x="2034231" y="2933962"/>
-              <a:ext cx="1152000" cy="1152000"/>
-              <a:chOff x="2034231" y="2933962"/>
-              <a:chExt cx="1152000" cy="1152000"/>
-            </a:xfrm>
-          </p:grpSpPr>
-          <p:cxnSp>
-            <p:nvCxnSpPr>
-              <p:cNvPr id="30" name="Straight Arrow Connector 29">
-                <a:extLst>
-                  <a:ext uri="{FF2B5EF4-FFF2-40B4-BE49-F238E27FC236}">
-                    <a16:creationId xmlns:a16="http://schemas.microsoft.com/office/drawing/2014/main" id="{8F224EA1-89B9-768A-00B3-E10736BF8C27}"/>
-                  </a:ext>
-                </a:extLst>
-              </p:cNvPr>
-              <p:cNvCxnSpPr>
-                <a:cxnSpLocks/>
-              </p:cNvCxnSpPr>
-              <p:nvPr/>
-            </p:nvCxnSpPr>
-            <p:spPr>
-              <a:xfrm flipH="1">
-                <a:off x="2034231" y="3509962"/>
-                <a:ext cx="1152000" cy="0"/>
-              </a:xfrm>
-              <a:prstGeom prst="straightConnector1">
-                <a:avLst/>
-              </a:prstGeom>
-              <a:ln w="101600">
-                <a:solidFill>
-                  <a:schemeClr val="bg1"/>
-                </a:solidFill>
-                <a:headEnd type="triangle" w="med" len="med"/>
-                <a:tailEnd type="triangle"/>
-              </a:ln>
-            </p:spPr>
-            <p:style>
-              <a:lnRef idx="2">
-                <a:schemeClr val="accent1"/>
-              </a:lnRef>
-              <a:fillRef idx="0">
-                <a:schemeClr val="accent1"/>
-              </a:fillRef>
-              <a:effectRef idx="1">
-                <a:schemeClr val="accent1"/>
-              </a:effectRef>
-              <a:fontRef idx="minor">
-                <a:schemeClr val="tx1"/>
-              </a:fontRef>
-            </p:style>
-          </p:cxnSp>
-          <p:cxnSp>
-            <p:nvCxnSpPr>
-              <p:cNvPr id="31" name="Straight Arrow Connector 30">
-                <a:extLst>
-                  <a:ext uri="{FF2B5EF4-FFF2-40B4-BE49-F238E27FC236}">
-                    <a16:creationId xmlns:a16="http://schemas.microsoft.com/office/drawing/2014/main" id="{9D77056B-A12B-315F-CB3B-70F47FAC02D5}"/>
-                  </a:ext>
-                </a:extLst>
-              </p:cNvPr>
-              <p:cNvCxnSpPr>
-                <a:cxnSpLocks/>
-              </p:cNvCxnSpPr>
-              <p:nvPr/>
-            </p:nvCxnSpPr>
-            <p:spPr>
-              <a:xfrm flipV="1">
-                <a:off x="2610231" y="2933962"/>
-                <a:ext cx="0" cy="1152000"/>
-              </a:xfrm>
-              <a:prstGeom prst="straightConnector1">
-                <a:avLst/>
-              </a:prstGeom>
-              <a:ln w="101600">
-                <a:solidFill>
-                  <a:schemeClr val="bg1"/>
-                </a:solidFill>
-                <a:headEnd type="triangle" w="med" len="med"/>
-                <a:tailEnd type="triangle"/>
-              </a:ln>
-            </p:spPr>
-            <p:style>
-              <a:lnRef idx="2">
-                <a:schemeClr val="accent1"/>
-              </a:lnRef>
-              <a:fillRef idx="0">
-                <a:schemeClr val="accent1"/>
-              </a:fillRef>
-              <a:effectRef idx="1">
-                <a:schemeClr val="accent1"/>
-              </a:effectRef>
-              <a:fontRef idx="minor">
-                <a:schemeClr val="tx1"/>
-              </a:fontRef>
-            </p:style>
-          </p:cxnSp>
-        </p:grpSp>
-        <p:sp>
-          <p:nvSpPr>
-            <p:cNvPr id="83" name="Rectangle 82">
-              <a:extLst>
-                <a:ext uri="{FF2B5EF4-FFF2-40B4-BE49-F238E27FC236}">
-                  <a16:creationId xmlns:a16="http://schemas.microsoft.com/office/drawing/2014/main" id="{FB0A96F4-67B8-632E-4E38-72CF0F10D9E6}"/>
-                </a:ext>
-              </a:extLst>
-            </p:cNvPr>
-            <p:cNvSpPr/>
-            <p:nvPr/>
-          </p:nvSpPr>
-          <p:spPr>
-            <a:xfrm>
-              <a:off x="1890231" y="2789962"/>
-              <a:ext cx="1440000" cy="1440000"/>
-            </a:xfrm>
-            <a:prstGeom prst="rect">
-              <a:avLst/>
-            </a:prstGeom>
-            <a:noFill/>
-            <a:ln>
-              <a:noFill/>
-            </a:ln>
-          </p:spPr>
-          <p:style>
-            <a:lnRef idx="2">
-              <a:schemeClr val="accent1">
-                <a:shade val="15000"/>
-              </a:schemeClr>
-            </a:lnRef>
-            <a:fillRef idx="1">
-              <a:schemeClr val="accent1"/>
-            </a:fillRef>
-            <a:effectRef idx="0">
-              <a:schemeClr val="accent1"/>
-            </a:effectRef>
-            <a:fontRef idx="minor">
-              <a:schemeClr val="lt1"/>
-            </a:fontRef>
-          </p:style>
-          <p:txBody>
-            <a:bodyPr rtlCol="0" anchor="ctr"/>
-            <a:lstStyle/>
-            <a:p>
-              <a:pPr algn="ctr"/>
-              <a:endParaRPr lang="en-NL" dirty="0"/>
-            </a:p>
-          </p:txBody>
-        </p:sp>
-      </p:grpSp>
-      <p:pic>
-        <p:nvPicPr>
-          <p:cNvPr id="26" name="Picture 25">
-            <a:extLst>
-              <a:ext uri="{FF2B5EF4-FFF2-40B4-BE49-F238E27FC236}">
-                <a16:creationId xmlns:a16="http://schemas.microsoft.com/office/drawing/2014/main" id="{941EA942-88F9-BCC8-1444-7BC93A2580D8}"/>
-              </a:ext>
-            </a:extLst>
-          </p:cNvPr>
-          <p:cNvPicPr>
-            <a:picLocks noChangeAspect="1"/>
-          </p:cNvPicPr>
-          <p:nvPr/>
-        </p:nvPicPr>
-        <p:blipFill>
-          <a:blip r:embed="rId6"/>
-          <a:stretch>
-            <a:fillRect/>
-          </a:stretch>
-        </p:blipFill>
-        <p:spPr>
-          <a:xfrm>
-            <a:off x="0" y="-2407161"/>
-            <a:ext cx="9906000" cy="2510141"/>
-          </a:xfrm>
-          <a:prstGeom prst="rect">
-            <a:avLst/>
-          </a:prstGeom>
-        </p:spPr>
-      </p:pic>
-      <p:sp>
-        <p:nvSpPr>
-          <p:cNvPr id="85" name="Rectangle 84">
-            <a:extLst>
-              <a:ext uri="{FF2B5EF4-FFF2-40B4-BE49-F238E27FC236}">
-                <a16:creationId xmlns:a16="http://schemas.microsoft.com/office/drawing/2014/main" id="{1291C0D1-78D3-89FD-4CFF-CBF39C269A70}"/>
-              </a:ext>
-            </a:extLst>
-          </p:cNvPr>
-          <p:cNvSpPr/>
-          <p:nvPr/>
-        </p:nvSpPr>
-        <p:spPr>
-          <a:xfrm>
-            <a:off x="7113000" y="1989000"/>
-            <a:ext cx="1440000" cy="1440000"/>
-          </a:xfrm>
-          <a:prstGeom prst="rect">
-            <a:avLst/>
-          </a:prstGeom>
-          <a:noFill/>
-          <a:ln>
-            <a:noFill/>
-          </a:ln>
-        </p:spPr>
-        <p:style>
-          <a:lnRef idx="2">
-            <a:schemeClr val="accent1">
-              <a:shade val="15000"/>
-            </a:schemeClr>
-          </a:lnRef>
-          <a:fillRef idx="1">
-            <a:schemeClr val="accent1"/>
-          </a:fillRef>
-          <a:effectRef idx="0">
-            <a:schemeClr val="accent1"/>
-          </a:effectRef>
-          <a:fontRef idx="minor">
-            <a:schemeClr val="lt1"/>
-          </a:fontRef>
-        </p:style>
-        <p:txBody>
-          <a:bodyPr rtlCol="0" anchor="t"/>
-          <a:lstStyle/>
-          <a:p>
-            <a:pPr algn="ctr"/>
-            <a:r>
-              <a:rPr lang="en-GB" sz="1100" b="1" dirty="0"/>
-              <a:t>Send a photo of […]</a:t>
-            </a:r>
-          </a:p>
-          <a:p>
-            <a:pPr algn="ctr"/>
-            <a:endParaRPr lang="en-GB" sz="1100" b="1" dirty="0"/>
-          </a:p>
-          <a:p>
-            <a:pPr algn="ctr"/>
-            <a:r>
-              <a:rPr lang="en-GB" sz="1100" b="1" dirty="0"/>
-              <a:t>A bridge</a:t>
-            </a:r>
-          </a:p>
-          <a:p>
-            <a:pPr algn="ctr"/>
-            <a:endParaRPr lang="en-GB" sz="1100" b="1" dirty="0"/>
-          </a:p>
-          <a:p>
-            <a:pPr algn="ctr"/>
-            <a:r>
-              <a:rPr lang="en-GB" sz="1100" b="1" dirty="0"/>
-              <a:t>A road</a:t>
-            </a:r>
-          </a:p>
-          <a:p>
-            <a:pPr algn="ctr"/>
-            <a:endParaRPr lang="en-GB" sz="1100" b="1" dirty="0"/>
-          </a:p>
-          <a:p>
-            <a:pPr algn="ctr"/>
-            <a:r>
-              <a:rPr lang="en-GB" sz="1100" b="1" dirty="0"/>
-              <a:t>A supermarket</a:t>
-            </a:r>
-          </a:p>
-          <a:p>
-            <a:pPr algn="ctr"/>
-            <a:endParaRPr lang="en-GB" sz="1100" b="1" dirty="0"/>
-          </a:p>
-          <a:p>
-            <a:pPr algn="ctr"/>
-            <a:r>
-              <a:rPr lang="en-GB" sz="1100" b="1" dirty="0"/>
-              <a:t>A snack bar</a:t>
-            </a:r>
-          </a:p>
-          <a:p>
-            <a:pPr algn="ctr"/>
-            <a:endParaRPr lang="en-GB" sz="1100" b="1" dirty="0"/>
-          </a:p>
-          <a:p>
-            <a:pPr algn="ctr"/>
-            <a:r>
-              <a:rPr lang="en-GB" sz="1100" b="1" dirty="0"/>
-              <a:t>A museum</a:t>
-            </a:r>
-          </a:p>
-          <a:p>
-            <a:pPr algn="ctr"/>
-            <a:endParaRPr lang="en-GB" sz="1100" b="1" dirty="0"/>
-          </a:p>
-          <a:p>
-            <a:pPr algn="ctr"/>
-            <a:r>
-              <a:rPr lang="en-GB" sz="1100" b="1" dirty="0"/>
-              <a:t>A school</a:t>
-            </a:r>
-          </a:p>
-          <a:p>
-            <a:pPr algn="ctr"/>
-            <a:endParaRPr lang="en-GB" sz="1100" b="1" dirty="0"/>
-          </a:p>
-          <a:p>
-            <a:pPr algn="ctr"/>
-            <a:r>
-              <a:rPr lang="en-GB" sz="1100" b="1" dirty="0"/>
-              <a:t>The tallest building you can see</a:t>
-            </a:r>
-          </a:p>
-          <a:p>
-            <a:pPr algn="ctr"/>
-            <a:endParaRPr lang="en-GB" sz="1100" b="1" dirty="0"/>
-          </a:p>
-          <a:p>
-            <a:pPr algn="ctr"/>
-            <a:r>
-              <a:rPr lang="en-GB" sz="1100" b="1" dirty="0"/>
-              <a:t>The largest body of water that you can see</a:t>
-            </a:r>
-          </a:p>
-          <a:p>
-            <a:pPr algn="ctr"/>
-            <a:endParaRPr lang="en-GB" sz="1100" b="1" dirty="0"/>
-          </a:p>
-          <a:p>
-            <a:pPr algn="ctr"/>
-            <a:r>
-              <a:rPr lang="en-GB" sz="1100" b="1" dirty="0"/>
-              <a:t>A 500 m </a:t>
-            </a:r>
-            <a:r>
-              <a:rPr lang="en-GB" sz="1100" b="1" dirty="0" err="1"/>
-              <a:t>strava</a:t>
-            </a:r>
-            <a:r>
-              <a:rPr lang="en-GB" sz="1100" b="1" dirty="0"/>
-              <a:t> route</a:t>
-            </a:r>
-          </a:p>
-          <a:p>
-            <a:pPr algn="ctr"/>
-            <a:endParaRPr lang="en-GB" sz="1100" b="1" dirty="0"/>
-          </a:p>
-          <a:p>
-            <a:pPr algn="ctr"/>
-            <a:endParaRPr lang="en-GB" sz="1100" b="1" dirty="0"/>
-          </a:p>
-          <a:p>
-            <a:pPr algn="ctr"/>
-            <a:endParaRPr lang="en-GB" sz="1100" b="1" dirty="0"/>
-          </a:p>
-          <a:p>
-            <a:pPr algn="ctr"/>
-            <a:endParaRPr lang="en-GB" sz="1100" b="1" dirty="0"/>
-          </a:p>
-          <a:p>
-            <a:pPr algn="ctr"/>
-            <a:endParaRPr lang="en-GB" sz="1100" b="1" dirty="0"/>
-          </a:p>
-          <a:p>
-            <a:pPr algn="ctr"/>
-            <a:endParaRPr lang="en-GB" sz="1100" b="1" dirty="0"/>
-          </a:p>
-          <a:p>
-            <a:pPr algn="ctr"/>
-            <a:endParaRPr lang="en-GB" sz="1100" b="1" dirty="0"/>
-          </a:p>
-          <a:p>
-            <a:pPr algn="ctr"/>
-            <a:endParaRPr lang="en-GB" sz="1100" b="1" dirty="0"/>
-          </a:p>
-          <a:p>
-            <a:pPr algn="ctr"/>
-            <a:endParaRPr lang="en-NL" sz="1100" b="1" dirty="0"/>
-          </a:p>
-        </p:txBody>
-      </p:sp>
-      <p:sp>
-        <p:nvSpPr>
-          <p:cNvPr id="87" name="Rectangle 86">
-            <a:extLst>
-              <a:ext uri="{FF2B5EF4-FFF2-40B4-BE49-F238E27FC236}">
-                <a16:creationId xmlns:a16="http://schemas.microsoft.com/office/drawing/2014/main" id="{120B2DCF-A3BD-F86D-904B-DF3F93B44EF0}"/>
-              </a:ext>
-            </a:extLst>
-          </p:cNvPr>
-          <p:cNvSpPr/>
-          <p:nvPr/>
-        </p:nvSpPr>
-        <p:spPr>
-          <a:xfrm>
-            <a:off x="1353000" y="1989000"/>
-            <a:ext cx="1440000" cy="1440000"/>
-          </a:xfrm>
-          <a:prstGeom prst="rect">
-            <a:avLst/>
-          </a:prstGeom>
-          <a:noFill/>
-          <a:ln>
-            <a:noFill/>
-          </a:ln>
-        </p:spPr>
-        <p:style>
-          <a:lnRef idx="2">
-            <a:schemeClr val="accent1">
-              <a:shade val="15000"/>
-            </a:schemeClr>
-          </a:lnRef>
-          <a:fillRef idx="1">
-            <a:schemeClr val="accent1"/>
-          </a:fillRef>
-          <a:effectRef idx="0">
-            <a:schemeClr val="accent1"/>
-          </a:effectRef>
-          <a:fontRef idx="minor">
-            <a:schemeClr val="lt1"/>
-          </a:fontRef>
-        </p:style>
-        <p:txBody>
-          <a:bodyPr rtlCol="0" anchor="ctr"/>
-          <a:lstStyle/>
-          <a:p>
-            <a:pPr algn="ctr"/>
-            <a:endParaRPr lang="en-NL" sz="2500" b="1" dirty="0"/>
-          </a:p>
-        </p:txBody>
-      </p:sp>
-      <p:sp>
-        <p:nvSpPr>
-          <p:cNvPr id="89" name="Rectangle 88">
-            <a:extLst>
-              <a:ext uri="{FF2B5EF4-FFF2-40B4-BE49-F238E27FC236}">
-                <a16:creationId xmlns:a16="http://schemas.microsoft.com/office/drawing/2014/main" id="{A8EEFF5C-B9CB-1E17-1C4F-C57EAC74B825}"/>
-              </a:ext>
-            </a:extLst>
-          </p:cNvPr>
-          <p:cNvSpPr/>
-          <p:nvPr/>
-        </p:nvSpPr>
-        <p:spPr>
-          <a:xfrm>
-            <a:off x="1353000" y="1989000"/>
-            <a:ext cx="1440000" cy="1440000"/>
-          </a:xfrm>
-          <a:prstGeom prst="rect">
-            <a:avLst/>
-          </a:prstGeom>
-          <a:noFill/>
-          <a:ln>
-            <a:noFill/>
-          </a:ln>
-        </p:spPr>
-        <p:style>
-          <a:lnRef idx="2">
-            <a:schemeClr val="accent1">
-              <a:shade val="15000"/>
-            </a:schemeClr>
-          </a:lnRef>
-          <a:fillRef idx="1">
-            <a:schemeClr val="accent1"/>
-          </a:fillRef>
-          <a:effectRef idx="0">
-            <a:schemeClr val="accent1"/>
-          </a:effectRef>
-          <a:fontRef idx="minor">
-            <a:schemeClr val="lt1"/>
-          </a:fontRef>
-        </p:style>
-        <p:txBody>
-          <a:bodyPr rtlCol="0" anchor="t"/>
-          <a:lstStyle/>
-          <a:p>
-            <a:pPr algn="ctr"/>
-            <a:r>
-              <a:rPr lang="en-GB" sz="1100" b="1" dirty="0"/>
-              <a:t>Is your nearest […] the same as mine?</a:t>
-            </a:r>
-          </a:p>
-          <a:p>
-            <a:pPr algn="ctr"/>
-            <a:endParaRPr lang="en-GB" sz="1100" b="1" dirty="0"/>
-          </a:p>
-          <a:p>
-            <a:pPr algn="ctr"/>
-            <a:endParaRPr lang="en-GB" sz="1100" b="1" dirty="0"/>
-          </a:p>
-          <a:p>
-            <a:pPr algn="ctr"/>
-            <a:r>
-              <a:rPr lang="en-GB" sz="1100" b="1" dirty="0"/>
-              <a:t>Suburb</a:t>
-            </a:r>
-          </a:p>
-          <a:p>
-            <a:pPr algn="ctr"/>
-            <a:endParaRPr lang="en-GB" sz="1100" b="1" dirty="0"/>
-          </a:p>
-          <a:p>
-            <a:pPr algn="ctr"/>
-            <a:r>
-              <a:rPr lang="en-GB" sz="1100" b="1" dirty="0"/>
-              <a:t>Water body</a:t>
-            </a:r>
-          </a:p>
-          <a:p>
-            <a:pPr algn="ctr"/>
-            <a:r>
-              <a:rPr lang="en-GB" sz="1100" b="1" dirty="0"/>
-              <a:t>(Maas, </a:t>
-            </a:r>
-            <a:r>
-              <a:rPr lang="en-GB" sz="1100" b="1" dirty="0" err="1"/>
-              <a:t>Kralingse</a:t>
-            </a:r>
-            <a:r>
-              <a:rPr lang="en-GB" sz="1100" b="1" dirty="0"/>
-              <a:t> Plas, …)</a:t>
-            </a:r>
-          </a:p>
-          <a:p>
-            <a:pPr algn="ctr"/>
-            <a:endParaRPr lang="en-GB" sz="1100" b="1" dirty="0"/>
-          </a:p>
-          <a:p>
-            <a:pPr algn="ctr"/>
-            <a:r>
-              <a:rPr lang="en-GB" sz="1100" b="1" dirty="0"/>
-              <a:t>A-road </a:t>
-            </a:r>
-          </a:p>
-          <a:p>
-            <a:pPr algn="ctr"/>
-            <a:r>
-              <a:rPr lang="en-GB" sz="1100" b="1" dirty="0"/>
-              <a:t>(A20, A15, …)</a:t>
-            </a:r>
-          </a:p>
-          <a:p>
-            <a:pPr algn="ctr"/>
-            <a:endParaRPr lang="en-GB" sz="1100" b="1" dirty="0"/>
-          </a:p>
-          <a:p>
-            <a:pPr algn="ctr"/>
-            <a:r>
-              <a:rPr lang="en-GB" sz="1100" b="1" dirty="0"/>
-              <a:t>Train station</a:t>
-            </a:r>
-          </a:p>
-          <a:p>
-            <a:pPr algn="ctr"/>
-            <a:endParaRPr lang="en-GB" sz="1100" b="1" dirty="0"/>
-          </a:p>
-          <a:p>
-            <a:pPr algn="ctr"/>
-            <a:r>
-              <a:rPr lang="en-GB" sz="1100" b="1" dirty="0"/>
-              <a:t>Metro station</a:t>
-            </a:r>
-          </a:p>
-          <a:p>
-            <a:pPr algn="ctr"/>
-            <a:endParaRPr lang="en-GB" sz="1100" b="1" dirty="0"/>
-          </a:p>
-          <a:p>
-            <a:pPr algn="ctr"/>
-            <a:r>
-              <a:rPr lang="en-GB" sz="1100" b="1" dirty="0"/>
-              <a:t>Tram station</a:t>
-            </a:r>
-          </a:p>
-          <a:p>
-            <a:pPr algn="ctr"/>
-            <a:endParaRPr lang="en-GB" sz="1100" b="1" dirty="0"/>
-          </a:p>
-          <a:p>
-            <a:pPr algn="ctr"/>
-            <a:endParaRPr lang="en-GB" sz="1100" b="1" dirty="0"/>
-          </a:p>
-          <a:p>
-            <a:pPr algn="ctr"/>
-            <a:endParaRPr lang="en-GB" sz="1100" b="1" dirty="0"/>
-          </a:p>
-          <a:p>
-            <a:pPr algn="ctr"/>
-            <a:endParaRPr lang="en-GB" sz="1100" b="1" dirty="0"/>
-          </a:p>
-          <a:p>
-            <a:pPr algn="ctr"/>
-            <a:endParaRPr lang="en-GB" sz="1100" b="1" dirty="0"/>
-          </a:p>
-          <a:p>
-            <a:pPr algn="ctr"/>
-            <a:endParaRPr lang="en-GB" sz="1100" b="1" dirty="0"/>
-          </a:p>
-          <a:p>
-            <a:pPr algn="ctr"/>
-            <a:endParaRPr lang="en-GB" sz="1100" b="1" dirty="0"/>
-          </a:p>
-          <a:p>
-            <a:pPr algn="ctr"/>
-            <a:endParaRPr lang="en-NL" sz="1100" b="1" dirty="0"/>
-          </a:p>
-        </p:txBody>
-      </p:sp>
-      <p:sp>
-        <p:nvSpPr>
-          <p:cNvPr id="91" name="Rectangle 90">
-            <a:extLst>
-              <a:ext uri="{FF2B5EF4-FFF2-40B4-BE49-F238E27FC236}">
-                <a16:creationId xmlns:a16="http://schemas.microsoft.com/office/drawing/2014/main" id="{975F2778-0BE5-B549-A01E-5F6D2AFFB1CE}"/>
-              </a:ext>
-            </a:extLst>
-          </p:cNvPr>
-          <p:cNvSpPr/>
-          <p:nvPr/>
-        </p:nvSpPr>
-        <p:spPr>
-          <a:xfrm>
-            <a:off x="2793000" y="1989000"/>
-            <a:ext cx="1440000" cy="1440000"/>
-          </a:xfrm>
-          <a:prstGeom prst="rect">
-            <a:avLst/>
-          </a:prstGeom>
-          <a:noFill/>
-          <a:ln>
-            <a:noFill/>
-          </a:ln>
-        </p:spPr>
-        <p:style>
-          <a:lnRef idx="2">
-            <a:schemeClr val="accent1">
-              <a:shade val="15000"/>
-            </a:schemeClr>
-          </a:lnRef>
-          <a:fillRef idx="1">
-            <a:schemeClr val="accent1"/>
-          </a:fillRef>
-          <a:effectRef idx="0">
-            <a:schemeClr val="accent1"/>
-          </a:effectRef>
-          <a:fontRef idx="minor">
-            <a:schemeClr val="lt1"/>
-          </a:fontRef>
-        </p:style>
-        <p:txBody>
-          <a:bodyPr rtlCol="0" anchor="t"/>
-          <a:lstStyle/>
-          <a:p>
-            <a:pPr algn="ctr"/>
-            <a:r>
-              <a:rPr lang="en-GB" sz="1100" b="1" dirty="0"/>
-              <a:t>Compared to me, are you closer to or further from a […]?</a:t>
-            </a:r>
-          </a:p>
-          <a:p>
-            <a:pPr algn="ctr"/>
-            <a:endParaRPr lang="en-GB" sz="1100" b="1" dirty="0"/>
-          </a:p>
-          <a:p>
-            <a:pPr algn="ctr"/>
-            <a:r>
-              <a:rPr lang="en-GB" sz="1100" b="1" dirty="0"/>
-              <a:t>Church</a:t>
-            </a:r>
-          </a:p>
-          <a:p>
-            <a:pPr algn="ctr"/>
-            <a:endParaRPr lang="en-GB" sz="1100" b="1" dirty="0"/>
-          </a:p>
-          <a:p>
-            <a:pPr algn="ctr"/>
-            <a:r>
-              <a:rPr lang="en-GB" sz="1100" b="1" dirty="0"/>
-              <a:t>School</a:t>
-            </a:r>
-          </a:p>
-          <a:p>
-            <a:pPr algn="ctr"/>
-            <a:endParaRPr lang="en-GB" sz="1100" b="1" dirty="0"/>
-          </a:p>
-          <a:p>
-            <a:pPr algn="ctr"/>
-            <a:r>
-              <a:rPr lang="en-GB" sz="1100" b="1" dirty="0"/>
-              <a:t>Museum</a:t>
-            </a:r>
-          </a:p>
-          <a:p>
-            <a:pPr algn="ctr"/>
-            <a:endParaRPr lang="en-GB" sz="1100" b="1" dirty="0"/>
-          </a:p>
-          <a:p>
-            <a:pPr algn="ctr"/>
-            <a:r>
-              <a:rPr lang="en-GB" sz="1100" b="1" dirty="0"/>
-              <a:t>Supermarket</a:t>
-            </a:r>
-          </a:p>
-          <a:p>
-            <a:pPr algn="ctr"/>
-            <a:endParaRPr lang="en-GB" sz="1100" b="1" dirty="0"/>
-          </a:p>
-          <a:p>
-            <a:pPr algn="ctr"/>
-            <a:r>
-              <a:rPr lang="en-GB" sz="1100" b="1" dirty="0"/>
-              <a:t>School</a:t>
-            </a:r>
-          </a:p>
-          <a:p>
-            <a:pPr algn="ctr"/>
-            <a:endParaRPr lang="en-GB" sz="1100" b="1" dirty="0"/>
-          </a:p>
-          <a:p>
-            <a:pPr algn="ctr"/>
-            <a:r>
-              <a:rPr lang="en-GB" sz="1100" b="1" dirty="0"/>
-              <a:t>Church</a:t>
-            </a:r>
-          </a:p>
-          <a:p>
-            <a:pPr algn="ctr"/>
-            <a:endParaRPr lang="en-GB" sz="1100" b="1" dirty="0"/>
-          </a:p>
-          <a:p>
-            <a:pPr algn="ctr"/>
-            <a:endParaRPr lang="en-GB" sz="1100" b="1" dirty="0"/>
-          </a:p>
-          <a:p>
-            <a:pPr algn="ctr"/>
-            <a:endParaRPr lang="en-GB" sz="1100" b="1" dirty="0"/>
-          </a:p>
-          <a:p>
-            <a:pPr algn="ctr"/>
-            <a:endParaRPr lang="en-NL" sz="1100" b="1" dirty="0"/>
-          </a:p>
-        </p:txBody>
-      </p:sp>
-      <p:sp>
-        <p:nvSpPr>
-          <p:cNvPr id="94" name="Rectangle 93">
-            <a:extLst>
-              <a:ext uri="{FF2B5EF4-FFF2-40B4-BE49-F238E27FC236}">
-                <a16:creationId xmlns:a16="http://schemas.microsoft.com/office/drawing/2014/main" id="{EB6BB4EC-BA51-A37D-3482-439A4D84AA9F}"/>
-              </a:ext>
-            </a:extLst>
-          </p:cNvPr>
-          <p:cNvSpPr/>
-          <p:nvPr/>
-        </p:nvSpPr>
-        <p:spPr>
-          <a:xfrm>
-            <a:off x="4233000" y="1989000"/>
-            <a:ext cx="1440000" cy="1440000"/>
-          </a:xfrm>
-          <a:prstGeom prst="rect">
-            <a:avLst/>
-          </a:prstGeom>
-          <a:noFill/>
-          <a:ln>
-            <a:noFill/>
-          </a:ln>
-        </p:spPr>
-        <p:style>
-          <a:lnRef idx="2">
-            <a:schemeClr val="accent1">
-              <a:shade val="15000"/>
-            </a:schemeClr>
-          </a:lnRef>
-          <a:fillRef idx="1">
-            <a:schemeClr val="accent1"/>
-          </a:fillRef>
-          <a:effectRef idx="0">
-            <a:schemeClr val="accent1"/>
-          </a:effectRef>
-          <a:fontRef idx="minor">
-            <a:schemeClr val="lt1"/>
-          </a:fontRef>
-        </p:style>
-        <p:txBody>
-          <a:bodyPr rtlCol="0" anchor="t"/>
-          <a:lstStyle/>
-          <a:p>
-            <a:pPr algn="ctr"/>
-            <a:r>
-              <a:rPr lang="en-GB" sz="1100" b="1" dirty="0"/>
-              <a:t>I’ve just travelled (at least) […]. Am I hotter or colder?</a:t>
-            </a:r>
-          </a:p>
-          <a:p>
-            <a:pPr algn="ctr"/>
-            <a:endParaRPr lang="en-GB" sz="1100" b="1" dirty="0"/>
-          </a:p>
-          <a:p>
-            <a:pPr algn="ctr"/>
-            <a:r>
-              <a:rPr lang="en-GB" sz="1100" b="1" dirty="0"/>
-              <a:t>2 km</a:t>
-            </a:r>
-          </a:p>
-          <a:p>
-            <a:pPr algn="ctr"/>
-            <a:endParaRPr lang="en-GB" sz="1100" b="1" dirty="0"/>
-          </a:p>
-          <a:p>
-            <a:pPr algn="ctr"/>
-            <a:r>
-              <a:rPr lang="en-GB" sz="1100" b="1" dirty="0"/>
-              <a:t>1 km</a:t>
-            </a:r>
-          </a:p>
-          <a:p>
-            <a:pPr algn="ctr"/>
-            <a:endParaRPr lang="en-GB" sz="1100" b="1" dirty="0"/>
-          </a:p>
-          <a:p>
-            <a:pPr algn="ctr"/>
-            <a:r>
-              <a:rPr lang="en-GB" sz="1100" b="1" dirty="0"/>
-              <a:t>500 m</a:t>
-            </a:r>
-            <a:endParaRPr lang="en-NL" sz="1100" b="1" dirty="0"/>
-          </a:p>
-        </p:txBody>
-      </p:sp>
-      <p:sp>
-        <p:nvSpPr>
-          <p:cNvPr id="95" name="Rectangle 94">
-            <a:extLst>
-              <a:ext uri="{FF2B5EF4-FFF2-40B4-BE49-F238E27FC236}">
-                <a16:creationId xmlns:a16="http://schemas.microsoft.com/office/drawing/2014/main" id="{E1C14839-322C-0B5D-CE63-F2473C58C3B6}"/>
-              </a:ext>
-            </a:extLst>
-          </p:cNvPr>
-          <p:cNvSpPr/>
-          <p:nvPr/>
-        </p:nvSpPr>
-        <p:spPr>
-          <a:xfrm>
-            <a:off x="5673000" y="1989000"/>
-            <a:ext cx="1440000" cy="1440000"/>
-          </a:xfrm>
-          <a:prstGeom prst="rect">
-            <a:avLst/>
-          </a:prstGeom>
-          <a:noFill/>
-          <a:ln>
-            <a:noFill/>
-          </a:ln>
-        </p:spPr>
-        <p:style>
-          <a:lnRef idx="2">
-            <a:schemeClr val="accent1">
-              <a:shade val="15000"/>
-            </a:schemeClr>
-          </a:lnRef>
-          <a:fillRef idx="1">
-            <a:schemeClr val="accent1"/>
-          </a:fillRef>
-          <a:effectRef idx="0">
-            <a:schemeClr val="accent1"/>
-          </a:effectRef>
-          <a:fontRef idx="minor">
-            <a:schemeClr val="lt1"/>
-          </a:fontRef>
-        </p:style>
-        <p:txBody>
-          <a:bodyPr rtlCol="0" anchor="t"/>
-          <a:lstStyle/>
-          <a:p>
-            <a:pPr algn="ctr"/>
-            <a:r>
-              <a:rPr lang="en-GB" sz="1100" b="1" dirty="0"/>
-              <a:t>Are you within a distance of […] from me?</a:t>
-            </a:r>
-          </a:p>
-          <a:p>
-            <a:pPr algn="ctr"/>
-            <a:endParaRPr lang="en-GB" sz="1100" b="1" dirty="0"/>
-          </a:p>
-          <a:p>
-            <a:pPr algn="ctr"/>
-            <a:r>
-              <a:rPr lang="en-GB" sz="1100" b="1" dirty="0"/>
-              <a:t>5 km</a:t>
-            </a:r>
-          </a:p>
-          <a:p>
-            <a:pPr algn="ctr"/>
-            <a:endParaRPr lang="en-GB" sz="1100" b="1" dirty="0"/>
-          </a:p>
-          <a:p>
-            <a:pPr algn="ctr"/>
-            <a:r>
-              <a:rPr lang="en-GB" sz="1100" b="1" dirty="0"/>
-              <a:t>2 km</a:t>
-            </a:r>
-          </a:p>
-          <a:p>
-            <a:pPr algn="ctr"/>
-            <a:endParaRPr lang="en-GB" sz="1100" b="1" dirty="0"/>
-          </a:p>
-          <a:p>
-            <a:pPr algn="ctr"/>
-            <a:r>
-              <a:rPr lang="en-GB" sz="1100" b="1" dirty="0"/>
-              <a:t>1 km</a:t>
-            </a:r>
-          </a:p>
-          <a:p>
-            <a:pPr algn="ctr"/>
-            <a:endParaRPr lang="en-GB" sz="1100" b="1" dirty="0"/>
-          </a:p>
-          <a:p>
-            <a:pPr algn="ctr"/>
-            <a:r>
-              <a:rPr lang="en-GB" sz="1100" b="1" dirty="0"/>
-              <a:t>500 m</a:t>
-            </a:r>
-          </a:p>
-          <a:p>
-            <a:pPr algn="ctr"/>
-            <a:endParaRPr lang="en-GB" sz="1100" b="1" dirty="0"/>
-          </a:p>
-          <a:p>
-            <a:pPr algn="ctr"/>
-            <a:r>
-              <a:rPr lang="en-GB" sz="1100" b="1" dirty="0"/>
-              <a:t>250 m</a:t>
-            </a:r>
-          </a:p>
-        </p:txBody>
-      </p:sp>
-    </p:spTree>
-    <p:extLst>
-      <p:ext uri="{BB962C8B-B14F-4D97-AF65-F5344CB8AC3E}">
-        <p14:creationId xmlns:p14="http://schemas.microsoft.com/office/powerpoint/2010/main" val="2551694278"/>
-      </p:ext>
-    </p:extLst>
-  </p:cSld>
-  <p:clrMapOvr>
-    <a:masterClrMapping/>
-  </p:clrMapOvr>
-</p:sld>
-</file>
-
-<file path=ppt/slides/slide7.xml><?xml version="1.0" encoding="utf-8"?>
-<p:sld xmlns:a="http://schemas.openxmlformats.org/drawingml/2006/main" xmlns:r="http://schemas.openxmlformats.org/officeDocument/2006/relationships" xmlns:p="http://schemas.openxmlformats.org/presentationml/2006/main">
-  <p:cSld>
-    <p:spTree>
-      <p:nvGrpSpPr>
-        <p:cNvPr id="1" name="">
-          <a:extLst>
-            <a:ext uri="{FF2B5EF4-FFF2-40B4-BE49-F238E27FC236}">
               <a16:creationId xmlns:a16="http://schemas.microsoft.com/office/drawing/2014/main" id="{EDD6B33D-5C04-BCF7-ECE8-9338D53BB0C5}"/>
             </a:ext>
           </a:extLst>
@@ -12646,7 +10373,7 @@
               <a:pPr algn="ctr"/>
               <a:r>
                 <a:rPr lang="en-GB" sz="1600" b="1" dirty="0"/>
-                <a:t>Train Station</a:t>
+                <a:t>Train Line</a:t>
               </a:r>
             </a:p>
           </p:txBody>
@@ -13705,7 +11432,7 @@
               <a:pPr algn="ctr"/>
               <a:r>
                 <a:rPr lang="en-GB" sz="1600" b="1" dirty="0"/>
-                <a:t>Metro Station</a:t>
+                <a:t>Metro Line</a:t>
               </a:r>
             </a:p>
           </p:txBody>
@@ -15083,7 +12810,9 @@
                 </a:pathLst>
               </a:custGeom>
               <a:solidFill>
-                <a:schemeClr val="bg1"/>
+                <a:schemeClr val="bg1">
+                  <a:lumMod val="95000"/>
+                </a:schemeClr>
               </a:solidFill>
               <a:ln w="11906" cap="flat">
                 <a:noFill/>
@@ -15439,7 +13168,7 @@
               <a:pPr algn="ctr"/>
               <a:r>
                 <a:rPr lang="en-GB" sz="1600" b="1" dirty="0"/>
-                <a:t>Tram Station</a:t>
+                <a:t>Tram Line</a:t>
               </a:r>
             </a:p>
           </p:txBody>
@@ -16043,6 +13772,923 @@
           </p:spPr>
         </p:pic>
       </p:grpSp>
+      <p:grpSp>
+        <p:nvGrpSpPr>
+          <p:cNvPr id="27" name="Group 26">
+            <a:extLst>
+              <a:ext uri="{FF2B5EF4-FFF2-40B4-BE49-F238E27FC236}">
+                <a16:creationId xmlns:a16="http://schemas.microsoft.com/office/drawing/2014/main" id="{C876A481-DB43-848D-3FD5-9F26806CDFB6}"/>
+              </a:ext>
+            </a:extLst>
+          </p:cNvPr>
+          <p:cNvGrpSpPr/>
+          <p:nvPr/>
+        </p:nvGrpSpPr>
+        <p:grpSpPr>
+          <a:xfrm>
+            <a:off x="4233000" y="1989000"/>
+            <a:ext cx="1440000" cy="1440000"/>
+            <a:chOff x="4233000" y="1989000"/>
+            <a:chExt cx="1440000" cy="1440000"/>
+          </a:xfrm>
+        </p:grpSpPr>
+        <p:sp>
+          <p:nvSpPr>
+            <p:cNvPr id="6" name="Rectangle 5">
+              <a:extLst>
+                <a:ext uri="{FF2B5EF4-FFF2-40B4-BE49-F238E27FC236}">
+                  <a16:creationId xmlns:a16="http://schemas.microsoft.com/office/drawing/2014/main" id="{2C1AE6B9-C6D1-3465-BE11-872433F7052E}"/>
+                </a:ext>
+              </a:extLst>
+            </p:cNvPr>
+            <p:cNvSpPr/>
+            <p:nvPr/>
+          </p:nvSpPr>
+          <p:spPr>
+            <a:xfrm>
+              <a:off x="4233000" y="1989000"/>
+              <a:ext cx="1440000" cy="1440000"/>
+            </a:xfrm>
+            <a:prstGeom prst="rect">
+              <a:avLst/>
+            </a:prstGeom>
+            <a:noFill/>
+            <a:ln>
+              <a:noFill/>
+            </a:ln>
+          </p:spPr>
+          <p:style>
+            <a:lnRef idx="2">
+              <a:schemeClr val="accent1">
+                <a:shade val="15000"/>
+              </a:schemeClr>
+            </a:lnRef>
+            <a:fillRef idx="1">
+              <a:schemeClr val="accent1"/>
+            </a:fillRef>
+            <a:effectRef idx="0">
+              <a:schemeClr val="accent1"/>
+            </a:effectRef>
+            <a:fontRef idx="minor">
+              <a:schemeClr val="lt1"/>
+            </a:fontRef>
+          </p:style>
+          <p:txBody>
+            <a:bodyPr rtlCol="0" anchor="ctr"/>
+            <a:lstStyle/>
+            <a:p>
+              <a:pPr algn="ctr"/>
+              <a:endParaRPr lang="en-GB" sz="1600" b="1" dirty="0"/>
+            </a:p>
+            <a:p>
+              <a:pPr algn="ctr"/>
+              <a:endParaRPr lang="en-GB" sz="1600" b="1" dirty="0"/>
+            </a:p>
+            <a:p>
+              <a:pPr algn="ctr"/>
+              <a:endParaRPr lang="en-GB" sz="1600" b="1" dirty="0"/>
+            </a:p>
+            <a:p>
+              <a:pPr algn="ctr"/>
+              <a:endParaRPr lang="en-GB" sz="1600" b="1" dirty="0"/>
+            </a:p>
+            <a:p>
+              <a:pPr algn="ctr"/>
+              <a:r>
+                <a:rPr lang="en-GB" sz="1600" b="1" dirty="0"/>
+                <a:t>Street/Path</a:t>
+              </a:r>
+            </a:p>
+          </p:txBody>
+        </p:sp>
+        <p:grpSp>
+          <p:nvGrpSpPr>
+            <p:cNvPr id="24" name="Group 23">
+              <a:extLst>
+                <a:ext uri="{FF2B5EF4-FFF2-40B4-BE49-F238E27FC236}">
+                  <a16:creationId xmlns:a16="http://schemas.microsoft.com/office/drawing/2014/main" id="{EC17F677-1A1D-BB0E-08E5-3B836C2255E0}"/>
+                </a:ext>
+              </a:extLst>
+            </p:cNvPr>
+            <p:cNvGrpSpPr/>
+            <p:nvPr/>
+          </p:nvGrpSpPr>
+          <p:grpSpPr>
+            <a:xfrm>
+              <a:off x="4543482" y="2248784"/>
+              <a:ext cx="809567" cy="714374"/>
+              <a:chOff x="4544017" y="2126473"/>
+              <a:chExt cx="809567" cy="714374"/>
+            </a:xfrm>
+            <a:solidFill>
+              <a:schemeClr val="bg1">
+                <a:lumMod val="95000"/>
+              </a:schemeClr>
+            </a:solidFill>
+          </p:grpSpPr>
+          <p:sp>
+            <p:nvSpPr>
+              <p:cNvPr id="21" name="Freeform: Shape 20">
+                <a:extLst>
+                  <a:ext uri="{FF2B5EF4-FFF2-40B4-BE49-F238E27FC236}">
+                    <a16:creationId xmlns:a16="http://schemas.microsoft.com/office/drawing/2014/main" id="{E71DE1CA-154C-0E92-AD61-BF78DEA69711}"/>
+                  </a:ext>
+                </a:extLst>
+              </p:cNvPr>
+              <p:cNvSpPr/>
+              <p:nvPr/>
+            </p:nvSpPr>
+            <p:spPr>
+              <a:xfrm>
+                <a:off x="4627122" y="2212198"/>
+                <a:ext cx="212169" cy="371475"/>
+              </a:xfrm>
+              <a:custGeom>
+                <a:avLst/>
+                <a:gdLst>
+                  <a:gd name="connsiteX0" fmla="*/ 155362 w 212169"/>
+                  <a:gd name="connsiteY0" fmla="*/ 199720 h 371475"/>
+                  <a:gd name="connsiteX1" fmla="*/ 190319 w 212169"/>
+                  <a:gd name="connsiteY1" fmla="*/ 199720 h 371475"/>
+                  <a:gd name="connsiteX2" fmla="*/ 106194 w 212169"/>
+                  <a:gd name="connsiteY2" fmla="*/ 0 h 371475"/>
+                  <a:gd name="connsiteX3" fmla="*/ 21850 w 212169"/>
+                  <a:gd name="connsiteY3" fmla="*/ 199720 h 371475"/>
+                  <a:gd name="connsiteX4" fmla="*/ 56817 w 212169"/>
+                  <a:gd name="connsiteY4" fmla="*/ 199720 h 371475"/>
+                  <a:gd name="connsiteX5" fmla="*/ 0 w 212169"/>
+                  <a:gd name="connsiteY5" fmla="*/ 318373 h 371475"/>
+                  <a:gd name="connsiteX6" fmla="*/ 84344 w 212169"/>
+                  <a:gd name="connsiteY6" fmla="*/ 318373 h 371475"/>
+                  <a:gd name="connsiteX7" fmla="*/ 84344 w 212169"/>
+                  <a:gd name="connsiteY7" fmla="*/ 371475 h 371475"/>
+                  <a:gd name="connsiteX8" fmla="*/ 128045 w 212169"/>
+                  <a:gd name="connsiteY8" fmla="*/ 371475 h 371475"/>
+                  <a:gd name="connsiteX9" fmla="*/ 128045 w 212169"/>
+                  <a:gd name="connsiteY9" fmla="*/ 318373 h 371475"/>
+                  <a:gd name="connsiteX10" fmla="*/ 212169 w 212169"/>
+                  <a:gd name="connsiteY10" fmla="*/ 318373 h 371475"/>
+                  <a:gd name="connsiteX11" fmla="*/ 155362 w 212169"/>
+                  <a:gd name="connsiteY11" fmla="*/ 199720 h 371475"/>
+                  <a:gd name="connsiteX12" fmla="*/ 155362 w 212169"/>
+                  <a:gd name="connsiteY12" fmla="*/ 199720 h 371475"/>
+                </a:gdLst>
+                <a:ahLst/>
+                <a:cxnLst>
+                  <a:cxn ang="0">
+                    <a:pos x="connsiteX0" y="connsiteY0"/>
+                  </a:cxn>
+                  <a:cxn ang="0">
+                    <a:pos x="connsiteX1" y="connsiteY1"/>
+                  </a:cxn>
+                  <a:cxn ang="0">
+                    <a:pos x="connsiteX2" y="connsiteY2"/>
+                  </a:cxn>
+                  <a:cxn ang="0">
+                    <a:pos x="connsiteX3" y="connsiteY3"/>
+                  </a:cxn>
+                  <a:cxn ang="0">
+                    <a:pos x="connsiteX4" y="connsiteY4"/>
+                  </a:cxn>
+                  <a:cxn ang="0">
+                    <a:pos x="connsiteX5" y="connsiteY5"/>
+                  </a:cxn>
+                  <a:cxn ang="0">
+                    <a:pos x="connsiteX6" y="connsiteY6"/>
+                  </a:cxn>
+                  <a:cxn ang="0">
+                    <a:pos x="connsiteX7" y="connsiteY7"/>
+                  </a:cxn>
+                  <a:cxn ang="0">
+                    <a:pos x="connsiteX8" y="connsiteY8"/>
+                  </a:cxn>
+                  <a:cxn ang="0">
+                    <a:pos x="connsiteX9" y="connsiteY9"/>
+                  </a:cxn>
+                  <a:cxn ang="0">
+                    <a:pos x="connsiteX10" y="connsiteY10"/>
+                  </a:cxn>
+                  <a:cxn ang="0">
+                    <a:pos x="connsiteX11" y="connsiteY11"/>
+                  </a:cxn>
+                  <a:cxn ang="0">
+                    <a:pos x="connsiteX12" y="connsiteY12"/>
+                  </a:cxn>
+                </a:cxnLst>
+                <a:rect l="l" t="t" r="r" b="b"/>
+                <a:pathLst>
+                  <a:path w="212169" h="371475">
+                    <a:moveTo>
+                      <a:pt x="155362" y="199720"/>
+                    </a:moveTo>
+                    <a:lnTo>
+                      <a:pt x="190319" y="199720"/>
+                    </a:lnTo>
+                    <a:lnTo>
+                      <a:pt x="106194" y="0"/>
+                    </a:lnTo>
+                    <a:lnTo>
+                      <a:pt x="21850" y="199720"/>
+                    </a:lnTo>
+                    <a:lnTo>
+                      <a:pt x="56817" y="199720"/>
+                    </a:lnTo>
+                    <a:lnTo>
+                      <a:pt x="0" y="318373"/>
+                    </a:lnTo>
+                    <a:lnTo>
+                      <a:pt x="84344" y="318373"/>
+                    </a:lnTo>
+                    <a:lnTo>
+                      <a:pt x="84344" y="371475"/>
+                    </a:lnTo>
+                    <a:lnTo>
+                      <a:pt x="128045" y="371475"/>
+                    </a:lnTo>
+                    <a:lnTo>
+                      <a:pt x="128045" y="318373"/>
+                    </a:lnTo>
+                    <a:lnTo>
+                      <a:pt x="212169" y="318373"/>
+                    </a:lnTo>
+                    <a:lnTo>
+                      <a:pt x="155362" y="199720"/>
+                    </a:lnTo>
+                    <a:lnTo>
+                      <a:pt x="155362" y="199720"/>
+                    </a:lnTo>
+                    <a:close/>
+                  </a:path>
+                </a:pathLst>
+              </a:custGeom>
+              <a:grpFill/>
+              <a:ln w="9525" cap="flat">
+                <a:noFill/>
+                <a:prstDash val="solid"/>
+                <a:miter/>
+              </a:ln>
+            </p:spPr>
+            <p:txBody>
+              <a:bodyPr rtlCol="0" anchor="ctr"/>
+              <a:lstStyle/>
+              <a:p>
+                <a:endParaRPr lang="en-NL"/>
+              </a:p>
+            </p:txBody>
+          </p:sp>
+          <p:sp>
+            <p:nvSpPr>
+              <p:cNvPr id="22" name="Freeform: Shape 21">
+                <a:extLst>
+                  <a:ext uri="{FF2B5EF4-FFF2-40B4-BE49-F238E27FC236}">
+                    <a16:creationId xmlns:a16="http://schemas.microsoft.com/office/drawing/2014/main" id="{A04B81D0-5365-146F-B247-8B0B614AE70B}"/>
+                  </a:ext>
+                </a:extLst>
+              </p:cNvPr>
+              <p:cNvSpPr/>
+              <p:nvPr/>
+            </p:nvSpPr>
+            <p:spPr>
+              <a:xfrm>
+                <a:off x="5203985" y="2126473"/>
+                <a:ext cx="149599" cy="261918"/>
+              </a:xfrm>
+              <a:custGeom>
+                <a:avLst/>
+                <a:gdLst>
+                  <a:gd name="connsiteX0" fmla="*/ 109547 w 149599"/>
+                  <a:gd name="connsiteY0" fmla="*/ 140818 h 261918"/>
+                  <a:gd name="connsiteX1" fmla="*/ 134198 w 149599"/>
+                  <a:gd name="connsiteY1" fmla="*/ 140818 h 261918"/>
+                  <a:gd name="connsiteX2" fmla="*/ 74876 w 149599"/>
+                  <a:gd name="connsiteY2" fmla="*/ 0 h 261918"/>
+                  <a:gd name="connsiteX3" fmla="*/ 15411 w 149599"/>
+                  <a:gd name="connsiteY3" fmla="*/ 140818 h 261918"/>
+                  <a:gd name="connsiteX4" fmla="*/ 40062 w 149599"/>
+                  <a:gd name="connsiteY4" fmla="*/ 140818 h 261918"/>
+                  <a:gd name="connsiteX5" fmla="*/ 0 w 149599"/>
+                  <a:gd name="connsiteY5" fmla="*/ 224485 h 261918"/>
+                  <a:gd name="connsiteX6" fmla="*/ 59474 w 149599"/>
+                  <a:gd name="connsiteY6" fmla="*/ 224485 h 261918"/>
+                  <a:gd name="connsiteX7" fmla="*/ 59474 w 149599"/>
+                  <a:gd name="connsiteY7" fmla="*/ 261918 h 261918"/>
+                  <a:gd name="connsiteX8" fmla="*/ 90288 w 149599"/>
+                  <a:gd name="connsiteY8" fmla="*/ 261918 h 261918"/>
+                  <a:gd name="connsiteX9" fmla="*/ 90288 w 149599"/>
+                  <a:gd name="connsiteY9" fmla="*/ 224485 h 261918"/>
+                  <a:gd name="connsiteX10" fmla="*/ 149600 w 149599"/>
+                  <a:gd name="connsiteY10" fmla="*/ 224485 h 261918"/>
+                  <a:gd name="connsiteX11" fmla="*/ 109547 w 149599"/>
+                  <a:gd name="connsiteY11" fmla="*/ 140818 h 261918"/>
+                  <a:gd name="connsiteX12" fmla="*/ 109547 w 149599"/>
+                  <a:gd name="connsiteY12" fmla="*/ 140818 h 261918"/>
+                </a:gdLst>
+                <a:ahLst/>
+                <a:cxnLst>
+                  <a:cxn ang="0">
+                    <a:pos x="connsiteX0" y="connsiteY0"/>
+                  </a:cxn>
+                  <a:cxn ang="0">
+                    <a:pos x="connsiteX1" y="connsiteY1"/>
+                  </a:cxn>
+                  <a:cxn ang="0">
+                    <a:pos x="connsiteX2" y="connsiteY2"/>
+                  </a:cxn>
+                  <a:cxn ang="0">
+                    <a:pos x="connsiteX3" y="connsiteY3"/>
+                  </a:cxn>
+                  <a:cxn ang="0">
+                    <a:pos x="connsiteX4" y="connsiteY4"/>
+                  </a:cxn>
+                  <a:cxn ang="0">
+                    <a:pos x="connsiteX5" y="connsiteY5"/>
+                  </a:cxn>
+                  <a:cxn ang="0">
+                    <a:pos x="connsiteX6" y="connsiteY6"/>
+                  </a:cxn>
+                  <a:cxn ang="0">
+                    <a:pos x="connsiteX7" y="connsiteY7"/>
+                  </a:cxn>
+                  <a:cxn ang="0">
+                    <a:pos x="connsiteX8" y="connsiteY8"/>
+                  </a:cxn>
+                  <a:cxn ang="0">
+                    <a:pos x="connsiteX9" y="connsiteY9"/>
+                  </a:cxn>
+                  <a:cxn ang="0">
+                    <a:pos x="connsiteX10" y="connsiteY10"/>
+                  </a:cxn>
+                  <a:cxn ang="0">
+                    <a:pos x="connsiteX11" y="connsiteY11"/>
+                  </a:cxn>
+                  <a:cxn ang="0">
+                    <a:pos x="connsiteX12" y="connsiteY12"/>
+                  </a:cxn>
+                </a:cxnLst>
+                <a:rect l="l" t="t" r="r" b="b"/>
+                <a:pathLst>
+                  <a:path w="149599" h="261918">
+                    <a:moveTo>
+                      <a:pt x="109547" y="140818"/>
+                    </a:moveTo>
+                    <a:lnTo>
+                      <a:pt x="134198" y="140818"/>
+                    </a:lnTo>
+                    <a:lnTo>
+                      <a:pt x="74876" y="0"/>
+                    </a:lnTo>
+                    <a:lnTo>
+                      <a:pt x="15411" y="140818"/>
+                    </a:lnTo>
+                    <a:lnTo>
+                      <a:pt x="40062" y="140818"/>
+                    </a:lnTo>
+                    <a:lnTo>
+                      <a:pt x="0" y="224485"/>
+                    </a:lnTo>
+                    <a:lnTo>
+                      <a:pt x="59474" y="224485"/>
+                    </a:lnTo>
+                    <a:lnTo>
+                      <a:pt x="59474" y="261918"/>
+                    </a:lnTo>
+                    <a:lnTo>
+                      <a:pt x="90288" y="261918"/>
+                    </a:lnTo>
+                    <a:lnTo>
+                      <a:pt x="90288" y="224485"/>
+                    </a:lnTo>
+                    <a:lnTo>
+                      <a:pt x="149600" y="224485"/>
+                    </a:lnTo>
+                    <a:lnTo>
+                      <a:pt x="109547" y="140818"/>
+                    </a:lnTo>
+                    <a:lnTo>
+                      <a:pt x="109547" y="140818"/>
+                    </a:lnTo>
+                    <a:close/>
+                  </a:path>
+                </a:pathLst>
+              </a:custGeom>
+              <a:grpFill/>
+              <a:ln w="9525" cap="flat">
+                <a:noFill/>
+                <a:prstDash val="solid"/>
+                <a:miter/>
+              </a:ln>
+            </p:spPr>
+            <p:txBody>
+              <a:bodyPr rtlCol="0" anchor="ctr"/>
+              <a:lstStyle/>
+              <a:p>
+                <a:endParaRPr lang="en-NL"/>
+              </a:p>
+            </p:txBody>
+          </p:sp>
+          <p:sp>
+            <p:nvSpPr>
+              <p:cNvPr id="23" name="Freeform: Shape 22">
+                <a:extLst>
+                  <a:ext uri="{FF2B5EF4-FFF2-40B4-BE49-F238E27FC236}">
+                    <a16:creationId xmlns:a16="http://schemas.microsoft.com/office/drawing/2014/main" id="{3C87A8ED-6C1E-042E-58CA-89DAE4E8BC47}"/>
+                  </a:ext>
+                </a:extLst>
+              </p:cNvPr>
+              <p:cNvSpPr/>
+              <p:nvPr/>
+            </p:nvSpPr>
+            <p:spPr>
+              <a:xfrm>
+                <a:off x="4544017" y="2259816"/>
+                <a:ext cx="707311" cy="581031"/>
+              </a:xfrm>
+              <a:custGeom>
+                <a:avLst/>
+                <a:gdLst>
+                  <a:gd name="connsiteX0" fmla="*/ 474812 w 707311"/>
+                  <a:gd name="connsiteY0" fmla="*/ 72577 h 581031"/>
+                  <a:gd name="connsiteX1" fmla="*/ 639661 w 707311"/>
+                  <a:gd name="connsiteY1" fmla="*/ 164294 h 581031"/>
+                  <a:gd name="connsiteX2" fmla="*/ 683914 w 707311"/>
+                  <a:gd name="connsiteY2" fmla="*/ 332477 h 581031"/>
+                  <a:gd name="connsiteX3" fmla="*/ 523361 w 707311"/>
+                  <a:gd name="connsiteY3" fmla="*/ 581032 h 581031"/>
+                  <a:gd name="connsiteX4" fmla="*/ 0 w 707311"/>
+                  <a:gd name="connsiteY4" fmla="*/ 581032 h 581031"/>
+                  <a:gd name="connsiteX5" fmla="*/ 417052 w 707311"/>
+                  <a:gd name="connsiteY5" fmla="*/ 323599 h 581031"/>
+                  <a:gd name="connsiteX6" fmla="*/ 466725 w 707311"/>
+                  <a:gd name="connsiteY6" fmla="*/ 161932 h 581031"/>
+                  <a:gd name="connsiteX7" fmla="*/ 380448 w 707311"/>
+                  <a:gd name="connsiteY7" fmla="*/ 72206 h 581031"/>
+                  <a:gd name="connsiteX8" fmla="*/ 476250 w 707311"/>
+                  <a:gd name="connsiteY8" fmla="*/ 7 h 581031"/>
+                  <a:gd name="connsiteX9" fmla="*/ 514350 w 707311"/>
+                  <a:gd name="connsiteY9" fmla="*/ 7 h 581031"/>
+                  <a:gd name="connsiteX10" fmla="*/ 474812 w 707311"/>
+                  <a:gd name="connsiteY10" fmla="*/ 72577 h 581031"/>
+                </a:gdLst>
+                <a:ahLst/>
+                <a:cxnLst>
+                  <a:cxn ang="0">
+                    <a:pos x="connsiteX0" y="connsiteY0"/>
+                  </a:cxn>
+                  <a:cxn ang="0">
+                    <a:pos x="connsiteX1" y="connsiteY1"/>
+                  </a:cxn>
+                  <a:cxn ang="0">
+                    <a:pos x="connsiteX2" y="connsiteY2"/>
+                  </a:cxn>
+                  <a:cxn ang="0">
+                    <a:pos x="connsiteX3" y="connsiteY3"/>
+                  </a:cxn>
+                  <a:cxn ang="0">
+                    <a:pos x="connsiteX4" y="connsiteY4"/>
+                  </a:cxn>
+                  <a:cxn ang="0">
+                    <a:pos x="connsiteX5" y="connsiteY5"/>
+                  </a:cxn>
+                  <a:cxn ang="0">
+                    <a:pos x="connsiteX6" y="connsiteY6"/>
+                  </a:cxn>
+                  <a:cxn ang="0">
+                    <a:pos x="connsiteX7" y="connsiteY7"/>
+                  </a:cxn>
+                  <a:cxn ang="0">
+                    <a:pos x="connsiteX8" y="connsiteY8"/>
+                  </a:cxn>
+                  <a:cxn ang="0">
+                    <a:pos x="connsiteX9" y="connsiteY9"/>
+                  </a:cxn>
+                  <a:cxn ang="0">
+                    <a:pos x="connsiteX10" y="connsiteY10"/>
+                  </a:cxn>
+                </a:cxnLst>
+                <a:rect l="l" t="t" r="r" b="b"/>
+                <a:pathLst>
+                  <a:path w="707311" h="581031">
+                    <a:moveTo>
+                      <a:pt x="474812" y="72577"/>
+                    </a:moveTo>
+                    <a:cubicBezTo>
+                      <a:pt x="514750" y="99609"/>
+                      <a:pt x="621573" y="151416"/>
+                      <a:pt x="639661" y="164294"/>
+                    </a:cubicBezTo>
+                    <a:cubicBezTo>
+                      <a:pt x="664959" y="182296"/>
+                      <a:pt x="747141" y="222825"/>
+                      <a:pt x="683914" y="332477"/>
+                    </a:cubicBezTo>
+                    <a:cubicBezTo>
+                      <a:pt x="620687" y="442128"/>
+                      <a:pt x="562127" y="522929"/>
+                      <a:pt x="523361" y="581032"/>
+                    </a:cubicBezTo>
+                    <a:lnTo>
+                      <a:pt x="0" y="581032"/>
+                    </a:lnTo>
+                    <a:cubicBezTo>
+                      <a:pt x="130131" y="474209"/>
+                      <a:pt x="330460" y="386064"/>
+                      <a:pt x="417052" y="323599"/>
+                    </a:cubicBezTo>
+                    <a:cubicBezTo>
+                      <a:pt x="503644" y="261134"/>
+                      <a:pt x="508340" y="213948"/>
+                      <a:pt x="466725" y="161932"/>
+                    </a:cubicBezTo>
+                    <a:cubicBezTo>
+                      <a:pt x="428625" y="114307"/>
+                      <a:pt x="394449" y="100886"/>
+                      <a:pt x="380448" y="72206"/>
+                    </a:cubicBezTo>
+                    <a:cubicBezTo>
+                      <a:pt x="355521" y="21171"/>
+                      <a:pt x="445541" y="-432"/>
+                      <a:pt x="476250" y="7"/>
+                    </a:cubicBezTo>
+                    <a:cubicBezTo>
+                      <a:pt x="479974" y="7"/>
+                      <a:pt x="514350" y="7"/>
+                      <a:pt x="514350" y="7"/>
+                    </a:cubicBezTo>
+                    <a:cubicBezTo>
+                      <a:pt x="514350" y="7"/>
+                      <a:pt x="434864" y="45555"/>
+                      <a:pt x="474812" y="72577"/>
+                    </a:cubicBezTo>
+                    <a:close/>
+                  </a:path>
+                </a:pathLst>
+              </a:custGeom>
+              <a:grpFill/>
+              <a:ln w="9525" cap="flat">
+                <a:noFill/>
+                <a:prstDash val="solid"/>
+                <a:miter/>
+              </a:ln>
+            </p:spPr>
+            <p:txBody>
+              <a:bodyPr rtlCol="0" anchor="ctr"/>
+              <a:lstStyle/>
+              <a:p>
+                <a:endParaRPr lang="en-NL"/>
+              </a:p>
+            </p:txBody>
+          </p:sp>
+        </p:grpSp>
+      </p:grpSp>
+      <p:grpSp>
+        <p:nvGrpSpPr>
+          <p:cNvPr id="25" name="Group 24">
+            <a:extLst>
+              <a:ext uri="{FF2B5EF4-FFF2-40B4-BE49-F238E27FC236}">
+                <a16:creationId xmlns:a16="http://schemas.microsoft.com/office/drawing/2014/main" id="{445248A1-D2C7-3DA5-5DF5-2F5B33609A20}"/>
+              </a:ext>
+            </a:extLst>
+          </p:cNvPr>
+          <p:cNvGrpSpPr/>
+          <p:nvPr/>
+        </p:nvGrpSpPr>
+        <p:grpSpPr>
+          <a:xfrm>
+            <a:off x="7113000" y="4869000"/>
+            <a:ext cx="1440000" cy="1440000"/>
+            <a:chOff x="4233000" y="3429000"/>
+            <a:chExt cx="1440000" cy="1440000"/>
+          </a:xfrm>
+        </p:grpSpPr>
+        <p:sp>
+          <p:nvSpPr>
+            <p:cNvPr id="9" name="Rectangle 8">
+              <a:extLst>
+                <a:ext uri="{FF2B5EF4-FFF2-40B4-BE49-F238E27FC236}">
+                  <a16:creationId xmlns:a16="http://schemas.microsoft.com/office/drawing/2014/main" id="{5B9D503C-A53C-00F4-4A15-16B25F6BDC05}"/>
+                </a:ext>
+              </a:extLst>
+            </p:cNvPr>
+            <p:cNvSpPr/>
+            <p:nvPr/>
+          </p:nvSpPr>
+          <p:spPr>
+            <a:xfrm>
+              <a:off x="4233000" y="3429000"/>
+              <a:ext cx="1440000" cy="1440000"/>
+            </a:xfrm>
+            <a:prstGeom prst="rect">
+              <a:avLst/>
+            </a:prstGeom>
+            <a:noFill/>
+            <a:ln>
+              <a:noFill/>
+            </a:ln>
+          </p:spPr>
+          <p:style>
+            <a:lnRef idx="2">
+              <a:schemeClr val="accent1">
+                <a:shade val="15000"/>
+              </a:schemeClr>
+            </a:lnRef>
+            <a:fillRef idx="1">
+              <a:schemeClr val="accent1"/>
+            </a:fillRef>
+            <a:effectRef idx="0">
+              <a:schemeClr val="accent1"/>
+            </a:effectRef>
+            <a:fontRef idx="minor">
+              <a:schemeClr val="lt1"/>
+            </a:fontRef>
+          </p:style>
+          <p:txBody>
+            <a:bodyPr rtlCol="0" anchor="ctr"/>
+            <a:lstStyle/>
+            <a:p>
+              <a:pPr algn="ctr"/>
+              <a:endParaRPr lang="en-GB" sz="1600" b="1" dirty="0"/>
+            </a:p>
+            <a:p>
+              <a:pPr algn="ctr"/>
+              <a:endParaRPr lang="en-GB" sz="1600" b="1" dirty="0"/>
+            </a:p>
+            <a:p>
+              <a:pPr algn="ctr"/>
+              <a:endParaRPr lang="en-GB" sz="1600" b="1" dirty="0"/>
+            </a:p>
+            <a:p>
+              <a:pPr algn="ctr"/>
+              <a:endParaRPr lang="en-GB" sz="1600" b="1" dirty="0"/>
+            </a:p>
+            <a:p>
+              <a:pPr algn="ctr"/>
+              <a:r>
+                <a:rPr lang="en-GB" sz="1600" b="1" dirty="0"/>
+                <a:t>Park</a:t>
+              </a:r>
+            </a:p>
+          </p:txBody>
+        </p:sp>
+        <p:sp>
+          <p:nvSpPr>
+            <p:cNvPr id="18" name="Graphic 16" descr="Picnic table with solid fill">
+              <a:extLst>
+                <a:ext uri="{FF2B5EF4-FFF2-40B4-BE49-F238E27FC236}">
+                  <a16:creationId xmlns:a16="http://schemas.microsoft.com/office/drawing/2014/main" id="{A461F7AB-1A3C-4B18-47AE-17539186DB6F}"/>
+                </a:ext>
+              </a:extLst>
+            </p:cNvPr>
+            <p:cNvSpPr/>
+            <p:nvPr/>
+          </p:nvSpPr>
+          <p:spPr>
+            <a:xfrm>
+              <a:off x="4444017" y="3788047"/>
+              <a:ext cx="1017966" cy="648953"/>
+            </a:xfrm>
+            <a:custGeom>
+              <a:avLst/>
+              <a:gdLst>
+                <a:gd name="connsiteX0" fmla="*/ 389573 w 838200"/>
+                <a:gd name="connsiteY0" fmla="*/ 95250 h 534352"/>
+                <a:gd name="connsiteX1" fmla="*/ 447675 w 838200"/>
+                <a:gd name="connsiteY1" fmla="*/ 95250 h 534352"/>
+                <a:gd name="connsiteX2" fmla="*/ 519113 w 838200"/>
+                <a:gd name="connsiteY2" fmla="*/ 266700 h 534352"/>
+                <a:gd name="connsiteX3" fmla="*/ 319088 w 838200"/>
+                <a:gd name="connsiteY3" fmla="*/ 266700 h 534352"/>
+                <a:gd name="connsiteX4" fmla="*/ 389573 w 838200"/>
+                <a:gd name="connsiteY4" fmla="*/ 95250 h 534352"/>
+                <a:gd name="connsiteX5" fmla="*/ 152400 w 838200"/>
+                <a:gd name="connsiteY5" fmla="*/ 0 h 534352"/>
+                <a:gd name="connsiteX6" fmla="*/ 152400 w 838200"/>
+                <a:gd name="connsiteY6" fmla="*/ 95250 h 534352"/>
+                <a:gd name="connsiteX7" fmla="*/ 288608 w 838200"/>
+                <a:gd name="connsiteY7" fmla="*/ 95250 h 534352"/>
+                <a:gd name="connsiteX8" fmla="*/ 217170 w 838200"/>
+                <a:gd name="connsiteY8" fmla="*/ 266700 h 534352"/>
+                <a:gd name="connsiteX9" fmla="*/ 0 w 838200"/>
+                <a:gd name="connsiteY9" fmla="*/ 266700 h 534352"/>
+                <a:gd name="connsiteX10" fmla="*/ 0 w 838200"/>
+                <a:gd name="connsiteY10" fmla="*/ 323850 h 534352"/>
+                <a:gd name="connsiteX11" fmla="*/ 193358 w 838200"/>
+                <a:gd name="connsiteY11" fmla="*/ 323850 h 534352"/>
+                <a:gd name="connsiteX12" fmla="*/ 105728 w 838200"/>
+                <a:gd name="connsiteY12" fmla="*/ 534353 h 534352"/>
+                <a:gd name="connsiteX13" fmla="*/ 207645 w 838200"/>
+                <a:gd name="connsiteY13" fmla="*/ 534353 h 534352"/>
+                <a:gd name="connsiteX14" fmla="*/ 295275 w 838200"/>
+                <a:gd name="connsiteY14" fmla="*/ 323850 h 534352"/>
+                <a:gd name="connsiteX15" fmla="*/ 542925 w 838200"/>
+                <a:gd name="connsiteY15" fmla="*/ 323850 h 534352"/>
+                <a:gd name="connsiteX16" fmla="*/ 630555 w 838200"/>
+                <a:gd name="connsiteY16" fmla="*/ 534353 h 534352"/>
+                <a:gd name="connsiteX17" fmla="*/ 732473 w 838200"/>
+                <a:gd name="connsiteY17" fmla="*/ 534353 h 534352"/>
+                <a:gd name="connsiteX18" fmla="*/ 644843 w 838200"/>
+                <a:gd name="connsiteY18" fmla="*/ 323850 h 534352"/>
+                <a:gd name="connsiteX19" fmla="*/ 838200 w 838200"/>
+                <a:gd name="connsiteY19" fmla="*/ 323850 h 534352"/>
+                <a:gd name="connsiteX20" fmla="*/ 838200 w 838200"/>
+                <a:gd name="connsiteY20" fmla="*/ 266700 h 534352"/>
+                <a:gd name="connsiteX21" fmla="*/ 621030 w 838200"/>
+                <a:gd name="connsiteY21" fmla="*/ 266700 h 534352"/>
+                <a:gd name="connsiteX22" fmla="*/ 549593 w 838200"/>
+                <a:gd name="connsiteY22" fmla="*/ 95250 h 534352"/>
+                <a:gd name="connsiteX23" fmla="*/ 685800 w 838200"/>
+                <a:gd name="connsiteY23" fmla="*/ 95250 h 534352"/>
+                <a:gd name="connsiteX24" fmla="*/ 685800 w 838200"/>
+                <a:gd name="connsiteY24" fmla="*/ 0 h 534352"/>
+                <a:gd name="connsiteX25" fmla="*/ 152400 w 838200"/>
+                <a:gd name="connsiteY25" fmla="*/ 0 h 534352"/>
+              </a:gdLst>
+              <a:ahLst/>
+              <a:cxnLst>
+                <a:cxn ang="0">
+                  <a:pos x="connsiteX0" y="connsiteY0"/>
+                </a:cxn>
+                <a:cxn ang="0">
+                  <a:pos x="connsiteX1" y="connsiteY1"/>
+                </a:cxn>
+                <a:cxn ang="0">
+                  <a:pos x="connsiteX2" y="connsiteY2"/>
+                </a:cxn>
+                <a:cxn ang="0">
+                  <a:pos x="connsiteX3" y="connsiteY3"/>
+                </a:cxn>
+                <a:cxn ang="0">
+                  <a:pos x="connsiteX4" y="connsiteY4"/>
+                </a:cxn>
+                <a:cxn ang="0">
+                  <a:pos x="connsiteX5" y="connsiteY5"/>
+                </a:cxn>
+                <a:cxn ang="0">
+                  <a:pos x="connsiteX6" y="connsiteY6"/>
+                </a:cxn>
+                <a:cxn ang="0">
+                  <a:pos x="connsiteX7" y="connsiteY7"/>
+                </a:cxn>
+                <a:cxn ang="0">
+                  <a:pos x="connsiteX8" y="connsiteY8"/>
+                </a:cxn>
+                <a:cxn ang="0">
+                  <a:pos x="connsiteX9" y="connsiteY9"/>
+                </a:cxn>
+                <a:cxn ang="0">
+                  <a:pos x="connsiteX10" y="connsiteY10"/>
+                </a:cxn>
+                <a:cxn ang="0">
+                  <a:pos x="connsiteX11" y="connsiteY11"/>
+                </a:cxn>
+                <a:cxn ang="0">
+                  <a:pos x="connsiteX12" y="connsiteY12"/>
+                </a:cxn>
+                <a:cxn ang="0">
+                  <a:pos x="connsiteX13" y="connsiteY13"/>
+                </a:cxn>
+                <a:cxn ang="0">
+                  <a:pos x="connsiteX14" y="connsiteY14"/>
+                </a:cxn>
+                <a:cxn ang="0">
+                  <a:pos x="connsiteX15" y="connsiteY15"/>
+                </a:cxn>
+                <a:cxn ang="0">
+                  <a:pos x="connsiteX16" y="connsiteY16"/>
+                </a:cxn>
+                <a:cxn ang="0">
+                  <a:pos x="connsiteX17" y="connsiteY17"/>
+                </a:cxn>
+                <a:cxn ang="0">
+                  <a:pos x="connsiteX18" y="connsiteY18"/>
+                </a:cxn>
+                <a:cxn ang="0">
+                  <a:pos x="connsiteX19" y="connsiteY19"/>
+                </a:cxn>
+                <a:cxn ang="0">
+                  <a:pos x="connsiteX20" y="connsiteY20"/>
+                </a:cxn>
+                <a:cxn ang="0">
+                  <a:pos x="connsiteX21" y="connsiteY21"/>
+                </a:cxn>
+                <a:cxn ang="0">
+                  <a:pos x="connsiteX22" y="connsiteY22"/>
+                </a:cxn>
+                <a:cxn ang="0">
+                  <a:pos x="connsiteX23" y="connsiteY23"/>
+                </a:cxn>
+                <a:cxn ang="0">
+                  <a:pos x="connsiteX24" y="connsiteY24"/>
+                </a:cxn>
+                <a:cxn ang="0">
+                  <a:pos x="connsiteX25" y="connsiteY25"/>
+                </a:cxn>
+              </a:cxnLst>
+              <a:rect l="l" t="t" r="r" b="b"/>
+              <a:pathLst>
+                <a:path w="838200" h="534352">
+                  <a:moveTo>
+                    <a:pt x="389573" y="95250"/>
+                  </a:moveTo>
+                  <a:lnTo>
+                    <a:pt x="447675" y="95250"/>
+                  </a:lnTo>
+                  <a:lnTo>
+                    <a:pt x="519113" y="266700"/>
+                  </a:lnTo>
+                  <a:lnTo>
+                    <a:pt x="319088" y="266700"/>
+                  </a:lnTo>
+                  <a:lnTo>
+                    <a:pt x="389573" y="95250"/>
+                  </a:lnTo>
+                  <a:close/>
+                  <a:moveTo>
+                    <a:pt x="152400" y="0"/>
+                  </a:moveTo>
+                  <a:lnTo>
+                    <a:pt x="152400" y="95250"/>
+                  </a:lnTo>
+                  <a:lnTo>
+                    <a:pt x="288608" y="95250"/>
+                  </a:lnTo>
+                  <a:lnTo>
+                    <a:pt x="217170" y="266700"/>
+                  </a:lnTo>
+                  <a:lnTo>
+                    <a:pt x="0" y="266700"/>
+                  </a:lnTo>
+                  <a:lnTo>
+                    <a:pt x="0" y="323850"/>
+                  </a:lnTo>
+                  <a:lnTo>
+                    <a:pt x="193358" y="323850"/>
+                  </a:lnTo>
+                  <a:lnTo>
+                    <a:pt x="105728" y="534353"/>
+                  </a:lnTo>
+                  <a:lnTo>
+                    <a:pt x="207645" y="534353"/>
+                  </a:lnTo>
+                  <a:lnTo>
+                    <a:pt x="295275" y="323850"/>
+                  </a:lnTo>
+                  <a:lnTo>
+                    <a:pt x="542925" y="323850"/>
+                  </a:lnTo>
+                  <a:lnTo>
+                    <a:pt x="630555" y="534353"/>
+                  </a:lnTo>
+                  <a:lnTo>
+                    <a:pt x="732473" y="534353"/>
+                  </a:lnTo>
+                  <a:lnTo>
+                    <a:pt x="644843" y="323850"/>
+                  </a:lnTo>
+                  <a:lnTo>
+                    <a:pt x="838200" y="323850"/>
+                  </a:lnTo>
+                  <a:lnTo>
+                    <a:pt x="838200" y="266700"/>
+                  </a:lnTo>
+                  <a:lnTo>
+                    <a:pt x="621030" y="266700"/>
+                  </a:lnTo>
+                  <a:lnTo>
+                    <a:pt x="549593" y="95250"/>
+                  </a:lnTo>
+                  <a:lnTo>
+                    <a:pt x="685800" y="95250"/>
+                  </a:lnTo>
+                  <a:lnTo>
+                    <a:pt x="685800" y="0"/>
+                  </a:lnTo>
+                  <a:lnTo>
+                    <a:pt x="152400" y="0"/>
+                  </a:lnTo>
+                  <a:close/>
+                </a:path>
+              </a:pathLst>
+            </a:custGeom>
+            <a:solidFill>
+              <a:schemeClr val="bg1">
+                <a:lumMod val="95000"/>
+              </a:schemeClr>
+            </a:solidFill>
+            <a:ln w="9525" cap="flat">
+              <a:noFill/>
+              <a:prstDash val="solid"/>
+              <a:miter/>
+            </a:ln>
+          </p:spPr>
+          <p:txBody>
+            <a:bodyPr rtlCol="0" anchor="ctr"/>
+            <a:lstStyle/>
+            <a:p>
+              <a:endParaRPr lang="en-NL"/>
+            </a:p>
+          </p:txBody>
+        </p:sp>
+      </p:grpSp>
     </p:spTree>
     <p:extLst>
       <p:ext uri="{BB962C8B-B14F-4D97-AF65-F5344CB8AC3E}">
@@ -16056,7 +14702,7 @@
 </p:sld>
 </file>
 
-<file path=ppt/slides/slide8.xml><?xml version="1.0" encoding="utf-8"?>
+<file path=ppt/slides/slide7.xml><?xml version="1.0" encoding="utf-8"?>
 <p:sld xmlns:a="http://schemas.openxmlformats.org/drawingml/2006/main" xmlns:r="http://schemas.openxmlformats.org/officeDocument/2006/relationships" xmlns:p="http://schemas.openxmlformats.org/presentationml/2006/main">
   <p:cSld>
     <p:spTree>
@@ -20112,7 +18758,7 @@
 </p:sld>
 </file>
 
-<file path=ppt/slides/slide9.xml><?xml version="1.0" encoding="utf-8"?>
+<file path=ppt/slides/slide8.xml><?xml version="1.0" encoding="utf-8"?>
 <p:sld xmlns:a="http://schemas.openxmlformats.org/drawingml/2006/main" xmlns:r="http://schemas.openxmlformats.org/officeDocument/2006/relationships" xmlns:p="http://schemas.openxmlformats.org/presentationml/2006/main">
   <p:cSld>
     <p:spTree>
@@ -20392,7 +19038,7 @@
               <a:pPr algn="ctr"/>
               <a:r>
                 <a:rPr lang="en-GB" sz="1600" b="1" dirty="0"/>
-                <a:t>Strava Route</a:t>
+                <a:t>Trace Route</a:t>
               </a:r>
               <a:endParaRPr lang="en-NL" sz="1600" b="1" dirty="0"/>
             </a:p>
@@ -20483,7 +19129,7 @@
               <a:pPr algn="ctr"/>
               <a:r>
                 <a:rPr lang="en-GB" sz="1600" b="1" dirty="0"/>
-                <a:t>High Building</a:t>
+                <a:t>Building</a:t>
               </a:r>
               <a:endParaRPr lang="en-NL" sz="1600" b="1" dirty="0"/>
             </a:p>
@@ -21186,7 +19832,7 @@
               <a:pPr algn="ctr"/>
               <a:r>
                 <a:rPr lang="en-GB" sz="1600" b="1" dirty="0"/>
-                <a:t>Large Bridge</a:t>
+                <a:t>Bridge</a:t>
               </a:r>
               <a:endParaRPr lang="en-NL" sz="1600" b="1" dirty="0"/>
             </a:p>
@@ -21229,10 +19875,438 @@
           </p:spPr>
         </p:pic>
       </p:grpSp>
+      <p:grpSp>
+        <p:nvGrpSpPr>
+          <p:cNvPr id="12" name="Group 11">
+            <a:extLst>
+              <a:ext uri="{FF2B5EF4-FFF2-40B4-BE49-F238E27FC236}">
+                <a16:creationId xmlns:a16="http://schemas.microsoft.com/office/drawing/2014/main" id="{7F83C51F-858A-9180-6C33-65DE5E946B5A}"/>
+              </a:ext>
+            </a:extLst>
+          </p:cNvPr>
+          <p:cNvGrpSpPr/>
+          <p:nvPr/>
+        </p:nvGrpSpPr>
+        <p:grpSpPr>
+          <a:xfrm>
+            <a:off x="2073000" y="1989000"/>
+            <a:ext cx="1440000" cy="1440000"/>
+            <a:chOff x="2073000" y="1989000"/>
+            <a:chExt cx="1440000" cy="1440000"/>
+          </a:xfrm>
+        </p:grpSpPr>
+        <p:sp>
+          <p:nvSpPr>
+            <p:cNvPr id="11" name="Rectangle 10">
+              <a:extLst>
+                <a:ext uri="{FF2B5EF4-FFF2-40B4-BE49-F238E27FC236}">
+                  <a16:creationId xmlns:a16="http://schemas.microsoft.com/office/drawing/2014/main" id="{40EC4409-C7F7-9CEB-1677-1316F86A3ADF}"/>
+                </a:ext>
+              </a:extLst>
+            </p:cNvPr>
+            <p:cNvSpPr/>
+            <p:nvPr/>
+          </p:nvSpPr>
+          <p:spPr>
+            <a:xfrm>
+              <a:off x="2073000" y="1989000"/>
+              <a:ext cx="1440000" cy="1440000"/>
+            </a:xfrm>
+            <a:prstGeom prst="rect">
+              <a:avLst/>
+            </a:prstGeom>
+            <a:noFill/>
+            <a:ln>
+              <a:noFill/>
+            </a:ln>
+          </p:spPr>
+          <p:style>
+            <a:lnRef idx="2">
+              <a:schemeClr val="accent1">
+                <a:shade val="15000"/>
+              </a:schemeClr>
+            </a:lnRef>
+            <a:fillRef idx="1">
+              <a:schemeClr val="accent1"/>
+            </a:fillRef>
+            <a:effectRef idx="0">
+              <a:schemeClr val="accent1"/>
+            </a:effectRef>
+            <a:fontRef idx="minor">
+              <a:schemeClr val="lt1"/>
+            </a:fontRef>
+          </p:style>
+          <p:txBody>
+            <a:bodyPr rtlCol="0" anchor="ctr"/>
+            <a:lstStyle/>
+            <a:p>
+              <a:pPr algn="ctr"/>
+              <a:endParaRPr lang="en-GB" sz="1600" b="1" dirty="0"/>
+            </a:p>
+            <a:p>
+              <a:pPr algn="ctr"/>
+              <a:endParaRPr lang="en-GB" sz="1600" b="1" dirty="0"/>
+            </a:p>
+            <a:p>
+              <a:pPr algn="ctr"/>
+              <a:endParaRPr lang="en-GB" sz="1600" b="1" dirty="0"/>
+            </a:p>
+            <a:p>
+              <a:pPr algn="ctr"/>
+              <a:endParaRPr lang="en-GB" sz="1600" b="1" dirty="0"/>
+            </a:p>
+            <a:p>
+              <a:pPr algn="ctr"/>
+              <a:r>
+                <a:rPr lang="en-GB" sz="1600" b="1" dirty="0"/>
+                <a:t>Tree</a:t>
+              </a:r>
+              <a:endParaRPr lang="en-NL" sz="1600" b="1" dirty="0"/>
+            </a:p>
+          </p:txBody>
+        </p:sp>
+        <p:pic>
+          <p:nvPicPr>
+            <p:cNvPr id="2" name="Graphic 1" descr="Deciduous tree with solid fill">
+              <a:extLst>
+                <a:ext uri="{FF2B5EF4-FFF2-40B4-BE49-F238E27FC236}">
+                  <a16:creationId xmlns:a16="http://schemas.microsoft.com/office/drawing/2014/main" id="{5AD4EB12-3171-2F6C-D366-E29D83B3E64C}"/>
+                </a:ext>
+              </a:extLst>
+            </p:cNvPr>
+            <p:cNvPicPr>
+              <a:picLocks noChangeAspect="1"/>
+            </p:cNvPicPr>
+            <p:nvPr/>
+          </p:nvPicPr>
+          <p:blipFill>
+            <a:blip r:embed="rId9">
+              <a:extLst>
+                <a:ext uri="{96DAC541-7B7A-43D3-8B79-37D633B846F1}">
+                  <asvg:svgBlip xmlns:asvg="http://schemas.microsoft.com/office/drawing/2016/SVG/main" r:embed="rId10"/>
+                </a:ext>
+              </a:extLst>
+            </a:blip>
+            <a:stretch>
+              <a:fillRect/>
+            </a:stretch>
+          </p:blipFill>
+          <p:spPr>
+            <a:xfrm>
+              <a:off x="2341912" y="2107800"/>
+              <a:ext cx="914400" cy="914400"/>
+            </a:xfrm>
+            <a:prstGeom prst="rect">
+              <a:avLst/>
+            </a:prstGeom>
+          </p:spPr>
+        </p:pic>
+      </p:grpSp>
+      <p:pic>
+        <p:nvPicPr>
+          <p:cNvPr id="17" name="Graphic 16" descr="Electric Tower with solid fill">
+            <a:extLst>
+              <a:ext uri="{FF2B5EF4-FFF2-40B4-BE49-F238E27FC236}">
+                <a16:creationId xmlns:a16="http://schemas.microsoft.com/office/drawing/2014/main" id="{75B6EE98-B2D9-AC60-27B9-FEAF0A39C957}"/>
+              </a:ext>
+            </a:extLst>
+          </p:cNvPr>
+          <p:cNvPicPr>
+            <a:picLocks noChangeAspect="1"/>
+          </p:cNvPicPr>
+          <p:nvPr/>
+        </p:nvPicPr>
+        <p:blipFill>
+          <a:blip r:embed="rId11">
+            <a:extLst>
+              <a:ext uri="{96DAC541-7B7A-43D3-8B79-37D633B846F1}">
+                <asvg:svgBlip xmlns:asvg="http://schemas.microsoft.com/office/drawing/2016/SVG/main" r:embed="rId12"/>
+              </a:ext>
+            </a:extLst>
+          </a:blip>
+          <a:stretch>
+            <a:fillRect/>
+          </a:stretch>
+        </p:blipFill>
+        <p:spPr>
+          <a:xfrm>
+            <a:off x="2505000" y="3907800"/>
+            <a:ext cx="914400" cy="914400"/>
+          </a:xfrm>
+          <a:prstGeom prst="rect">
+            <a:avLst/>
+          </a:prstGeom>
+        </p:spPr>
+      </p:pic>
+      <p:grpSp>
+        <p:nvGrpSpPr>
+          <p:cNvPr id="19" name="Group 18">
+            <a:extLst>
+              <a:ext uri="{FF2B5EF4-FFF2-40B4-BE49-F238E27FC236}">
+                <a16:creationId xmlns:a16="http://schemas.microsoft.com/office/drawing/2014/main" id="{8378A01E-2189-0A29-B6AC-CE31025AA6ED}"/>
+              </a:ext>
+            </a:extLst>
+          </p:cNvPr>
+          <p:cNvGrpSpPr/>
+          <p:nvPr/>
+        </p:nvGrpSpPr>
+        <p:grpSpPr>
+          <a:xfrm>
+            <a:off x="3513000" y="1989000"/>
+            <a:ext cx="1440000" cy="1440000"/>
+            <a:chOff x="2073000" y="1989000"/>
+            <a:chExt cx="1440000" cy="1440000"/>
+          </a:xfrm>
+        </p:grpSpPr>
+        <p:sp>
+          <p:nvSpPr>
+            <p:cNvPr id="20" name="Rectangle 19">
+              <a:extLst>
+                <a:ext uri="{FF2B5EF4-FFF2-40B4-BE49-F238E27FC236}">
+                  <a16:creationId xmlns:a16="http://schemas.microsoft.com/office/drawing/2014/main" id="{157A5608-26FF-51A2-5BF5-DCCF7DF472F9}"/>
+                </a:ext>
+              </a:extLst>
+            </p:cNvPr>
+            <p:cNvSpPr/>
+            <p:nvPr/>
+          </p:nvSpPr>
+          <p:spPr>
+            <a:xfrm>
+              <a:off x="2073000" y="1989000"/>
+              <a:ext cx="1440000" cy="1440000"/>
+            </a:xfrm>
+            <a:prstGeom prst="rect">
+              <a:avLst/>
+            </a:prstGeom>
+            <a:noFill/>
+            <a:ln>
+              <a:noFill/>
+            </a:ln>
+          </p:spPr>
+          <p:style>
+            <a:lnRef idx="2">
+              <a:schemeClr val="accent1">
+                <a:shade val="15000"/>
+              </a:schemeClr>
+            </a:lnRef>
+            <a:fillRef idx="1">
+              <a:schemeClr val="accent1"/>
+            </a:fillRef>
+            <a:effectRef idx="0">
+              <a:schemeClr val="accent1"/>
+            </a:effectRef>
+            <a:fontRef idx="minor">
+              <a:schemeClr val="lt1"/>
+            </a:fontRef>
+          </p:style>
+          <p:txBody>
+            <a:bodyPr rtlCol="0" anchor="ctr"/>
+            <a:lstStyle/>
+            <a:p>
+              <a:pPr algn="ctr"/>
+              <a:endParaRPr lang="en-GB" sz="1600" b="1" dirty="0"/>
+            </a:p>
+            <a:p>
+              <a:pPr algn="ctr"/>
+              <a:endParaRPr lang="en-GB" sz="1600" b="1" dirty="0"/>
+            </a:p>
+            <a:p>
+              <a:pPr algn="ctr"/>
+              <a:endParaRPr lang="en-GB" sz="1600" b="1" dirty="0"/>
+            </a:p>
+            <a:p>
+              <a:pPr algn="ctr"/>
+              <a:endParaRPr lang="en-GB" sz="1600" b="1" dirty="0"/>
+            </a:p>
+            <a:p>
+              <a:pPr algn="ctr"/>
+              <a:r>
+                <a:rPr lang="en-GB" sz="1600" b="1" dirty="0"/>
+                <a:t>Tree</a:t>
+              </a:r>
+              <a:endParaRPr lang="en-NL" sz="1600" b="1" dirty="0"/>
+            </a:p>
+          </p:txBody>
+        </p:sp>
+        <p:pic>
+          <p:nvPicPr>
+            <p:cNvPr id="21" name="Graphic 20" descr="Deciduous tree with solid fill">
+              <a:extLst>
+                <a:ext uri="{FF2B5EF4-FFF2-40B4-BE49-F238E27FC236}">
+                  <a16:creationId xmlns:a16="http://schemas.microsoft.com/office/drawing/2014/main" id="{DE3A1A95-51F8-CA26-B6F9-A8E14C62589A}"/>
+                </a:ext>
+              </a:extLst>
+            </p:cNvPr>
+            <p:cNvPicPr>
+              <a:picLocks noChangeAspect="1"/>
+            </p:cNvPicPr>
+            <p:nvPr/>
+          </p:nvPicPr>
+          <p:blipFill>
+            <a:blip r:embed="rId9">
+              <a:extLst>
+                <a:ext uri="{96DAC541-7B7A-43D3-8B79-37D633B846F1}">
+                  <asvg:svgBlip xmlns:asvg="http://schemas.microsoft.com/office/drawing/2016/SVG/main" r:embed="rId10"/>
+                </a:ext>
+              </a:extLst>
+            </a:blip>
+            <a:stretch>
+              <a:fillRect/>
+            </a:stretch>
+          </p:blipFill>
+          <p:spPr>
+            <a:xfrm>
+              <a:off x="2341912" y="2107800"/>
+              <a:ext cx="914400" cy="914400"/>
+            </a:xfrm>
+            <a:prstGeom prst="rect">
+              <a:avLst/>
+            </a:prstGeom>
+          </p:spPr>
+        </p:pic>
+      </p:grpSp>
     </p:spTree>
     <p:extLst>
       <p:ext uri="{BB962C8B-B14F-4D97-AF65-F5344CB8AC3E}">
         <p14:creationId xmlns:p14="http://schemas.microsoft.com/office/powerpoint/2010/main" val="1631735405"/>
+      </p:ext>
+    </p:extLst>
+  </p:cSld>
+  <p:clrMapOvr>
+    <a:masterClrMapping/>
+  </p:clrMapOvr>
+</p:sld>
+</file>
+
+<file path=ppt/slides/slide9.xml><?xml version="1.0" encoding="utf-8"?>
+<p:sld xmlns:a="http://schemas.openxmlformats.org/drawingml/2006/main" xmlns:r="http://schemas.openxmlformats.org/officeDocument/2006/relationships" xmlns:p="http://schemas.openxmlformats.org/presentationml/2006/main">
+  <p:cSld>
+    <p:spTree>
+      <p:nvGrpSpPr>
+        <p:cNvPr id="1" name="">
+          <a:extLst>
+            <a:ext uri="{FF2B5EF4-FFF2-40B4-BE49-F238E27FC236}">
+              <a16:creationId xmlns:a16="http://schemas.microsoft.com/office/drawing/2014/main" id="{66BC7FFA-FE87-CA85-DEDD-960BFC25ECE9}"/>
+            </a:ext>
+          </a:extLst>
+        </p:cNvPr>
+        <p:cNvGrpSpPr/>
+        <p:nvPr/>
+      </p:nvGrpSpPr>
+      <p:grpSpPr>
+        <a:xfrm>
+          <a:off x="0" y="0"/>
+          <a:ext cx="0" cy="0"/>
+          <a:chOff x="0" y="0"/>
+          <a:chExt cx="0" cy="0"/>
+        </a:xfrm>
+      </p:grpSpPr>
+      <p:pic>
+        <p:nvPicPr>
+          <p:cNvPr id="26" name="Picture 25">
+            <a:extLst>
+              <a:ext uri="{FF2B5EF4-FFF2-40B4-BE49-F238E27FC236}">
+                <a16:creationId xmlns:a16="http://schemas.microsoft.com/office/drawing/2014/main" id="{78E9D0D8-2885-A675-10E7-443354A71468}"/>
+              </a:ext>
+            </a:extLst>
+          </p:cNvPr>
+          <p:cNvPicPr>
+            <a:picLocks noChangeAspect="1"/>
+          </p:cNvPicPr>
+          <p:nvPr/>
+        </p:nvPicPr>
+        <p:blipFill>
+          <a:blip r:embed="rId2"/>
+          <a:stretch>
+            <a:fillRect/>
+          </a:stretch>
+        </p:blipFill>
+        <p:spPr>
+          <a:xfrm>
+            <a:off x="0" y="-2407161"/>
+            <a:ext cx="9906000" cy="2510141"/>
+          </a:xfrm>
+          <a:prstGeom prst="rect">
+            <a:avLst/>
+          </a:prstGeom>
+        </p:spPr>
+      </p:pic>
+      <p:pic>
+        <p:nvPicPr>
+          <p:cNvPr id="30" name="Graphic 29" descr="Badge Follow with solid fill">
+            <a:extLst>
+              <a:ext uri="{FF2B5EF4-FFF2-40B4-BE49-F238E27FC236}">
+                <a16:creationId xmlns:a16="http://schemas.microsoft.com/office/drawing/2014/main" id="{A7A6E2D5-738F-ED61-0543-7762CE392A94}"/>
+              </a:ext>
+            </a:extLst>
+          </p:cNvPr>
+          <p:cNvPicPr>
+            <a:picLocks noChangeAspect="1"/>
+          </p:cNvPicPr>
+          <p:nvPr/>
+        </p:nvPicPr>
+        <p:blipFill>
+          <a:blip r:embed="rId3">
+            <a:extLst>
+              <a:ext uri="{96DAC541-7B7A-43D3-8B79-37D633B846F1}">
+                <asvg:svgBlip xmlns:asvg="http://schemas.microsoft.com/office/drawing/2016/SVG/main" r:embed="rId4"/>
+              </a:ext>
+            </a:extLst>
+          </a:blip>
+          <a:stretch>
+            <a:fillRect/>
+          </a:stretch>
+        </p:blipFill>
+        <p:spPr>
+          <a:xfrm>
+            <a:off x="3513000" y="2709000"/>
+            <a:ext cx="1440000" cy="1440000"/>
+          </a:xfrm>
+          <a:prstGeom prst="rect">
+            <a:avLst/>
+          </a:prstGeom>
+        </p:spPr>
+      </p:pic>
+      <p:pic>
+        <p:nvPicPr>
+          <p:cNvPr id="32" name="Graphic 31" descr="Magic Wand Auto with solid fill">
+            <a:extLst>
+              <a:ext uri="{FF2B5EF4-FFF2-40B4-BE49-F238E27FC236}">
+                <a16:creationId xmlns:a16="http://schemas.microsoft.com/office/drawing/2014/main" id="{AD598D14-58EA-9ED7-9172-C24FDE7380B5}"/>
+              </a:ext>
+            </a:extLst>
+          </p:cNvPr>
+          <p:cNvPicPr>
+            <a:picLocks noChangeAspect="1"/>
+          </p:cNvPicPr>
+          <p:nvPr/>
+        </p:nvPicPr>
+        <p:blipFill>
+          <a:blip r:embed="rId5">
+            <a:extLst>
+              <a:ext uri="{96DAC541-7B7A-43D3-8B79-37D633B846F1}">
+                <asvg:svgBlip xmlns:asvg="http://schemas.microsoft.com/office/drawing/2016/SVG/main" r:embed="rId6"/>
+              </a:ext>
+            </a:extLst>
+          </a:blip>
+          <a:stretch>
+            <a:fillRect/>
+          </a:stretch>
+        </p:blipFill>
+        <p:spPr>
+          <a:xfrm>
+            <a:off x="4953000" y="2709000"/>
+            <a:ext cx="1440000" cy="1440000"/>
+          </a:xfrm>
+          <a:prstGeom prst="rect">
+            <a:avLst/>
+          </a:prstGeom>
+        </p:spPr>
+      </p:pic>
+    </p:spTree>
+    <p:extLst>
+      <p:ext uri="{BB962C8B-B14F-4D97-AF65-F5344CB8AC3E}">
+        <p14:creationId xmlns:p14="http://schemas.microsoft.com/office/powerpoint/2010/main" val="3365089638"/>
       </p:ext>
     </p:extLst>
   </p:cSld>

</xml_diff>